<commit_message>
Remove LED pulse functions
</commit_message>
<xml_diff>
--- a/WBZ45x_CAN_BLE_Peripheral.pptx
+++ b/WBZ45x_CAN_BLE_Peripheral.pptx
@@ -14,11 +14,11 @@
     <p:sldId id="270" r:id="rId5"/>
     <p:sldId id="258" r:id="rId6"/>
     <p:sldId id="280" r:id="rId7"/>
-    <p:sldId id="274" r:id="rId8"/>
-    <p:sldId id="269" r:id="rId9"/>
-    <p:sldId id="260" r:id="rId10"/>
-    <p:sldId id="262" r:id="rId11"/>
-    <p:sldId id="263" r:id="rId12"/>
+    <p:sldId id="269" r:id="rId8"/>
+    <p:sldId id="260" r:id="rId9"/>
+    <p:sldId id="262" r:id="rId10"/>
+    <p:sldId id="263" r:id="rId11"/>
+    <p:sldId id="281" r:id="rId12"/>
     <p:sldId id="272" r:id="rId13"/>
     <p:sldId id="273" r:id="rId14"/>
     <p:sldId id="275" r:id="rId15"/>
@@ -214,7 +214,7 @@
           <a:p>
             <a:fld id="{D8FD1211-642A-3945-B534-00A1B00CEBCE}" type="datetimeFigureOut">
               <a:rPr lang="en-US" smtClean="0"/>
-              <a:t>9/5/24</a:t>
+              <a:t>9/14/24</a:t>
             </a:fld>
             <a:endParaRPr lang="en-US"/>
           </a:p>
@@ -728,7 +728,7 @@
           <a:p>
             <a:fld id="{7A5DC5CD-0095-2046-BF3C-100069736801}" type="datetimeFigureOut">
               <a:rPr lang="en-US" smtClean="0"/>
-              <a:t>9/5/24</a:t>
+              <a:t>9/14/24</a:t>
             </a:fld>
             <a:endParaRPr lang="en-US"/>
           </a:p>
@@ -926,7 +926,7 @@
           <a:p>
             <a:fld id="{7A5DC5CD-0095-2046-BF3C-100069736801}" type="datetimeFigureOut">
               <a:rPr lang="en-US" smtClean="0"/>
-              <a:t>9/5/24</a:t>
+              <a:t>9/14/24</a:t>
             </a:fld>
             <a:endParaRPr lang="en-US"/>
           </a:p>
@@ -1134,7 +1134,7 @@
           <a:p>
             <a:fld id="{7A5DC5CD-0095-2046-BF3C-100069736801}" type="datetimeFigureOut">
               <a:rPr lang="en-US" smtClean="0"/>
-              <a:t>9/5/24</a:t>
+              <a:t>9/14/24</a:t>
             </a:fld>
             <a:endParaRPr lang="en-US"/>
           </a:p>
@@ -1332,7 +1332,7 @@
           <a:p>
             <a:fld id="{7A5DC5CD-0095-2046-BF3C-100069736801}" type="datetimeFigureOut">
               <a:rPr lang="en-US" smtClean="0"/>
-              <a:t>9/5/24</a:t>
+              <a:t>9/14/24</a:t>
             </a:fld>
             <a:endParaRPr lang="en-US"/>
           </a:p>
@@ -1607,7 +1607,7 @@
           <a:p>
             <a:fld id="{7A5DC5CD-0095-2046-BF3C-100069736801}" type="datetimeFigureOut">
               <a:rPr lang="en-US" smtClean="0"/>
-              <a:t>9/5/24</a:t>
+              <a:t>9/14/24</a:t>
             </a:fld>
             <a:endParaRPr lang="en-US"/>
           </a:p>
@@ -1872,7 +1872,7 @@
           <a:p>
             <a:fld id="{7A5DC5CD-0095-2046-BF3C-100069736801}" type="datetimeFigureOut">
               <a:rPr lang="en-US" smtClean="0"/>
-              <a:t>9/5/24</a:t>
+              <a:t>9/14/24</a:t>
             </a:fld>
             <a:endParaRPr lang="en-US"/>
           </a:p>
@@ -2284,7 +2284,7 @@
           <a:p>
             <a:fld id="{7A5DC5CD-0095-2046-BF3C-100069736801}" type="datetimeFigureOut">
               <a:rPr lang="en-US" smtClean="0"/>
-              <a:t>9/5/24</a:t>
+              <a:t>9/14/24</a:t>
             </a:fld>
             <a:endParaRPr lang="en-US"/>
           </a:p>
@@ -2425,7 +2425,7 @@
           <a:p>
             <a:fld id="{7A5DC5CD-0095-2046-BF3C-100069736801}" type="datetimeFigureOut">
               <a:rPr lang="en-US" smtClean="0"/>
-              <a:t>9/5/24</a:t>
+              <a:t>9/14/24</a:t>
             </a:fld>
             <a:endParaRPr lang="en-US"/>
           </a:p>
@@ -2538,7 +2538,7 @@
           <a:p>
             <a:fld id="{7A5DC5CD-0095-2046-BF3C-100069736801}" type="datetimeFigureOut">
               <a:rPr lang="en-US" smtClean="0"/>
-              <a:t>9/5/24</a:t>
+              <a:t>9/14/24</a:t>
             </a:fld>
             <a:endParaRPr lang="en-US"/>
           </a:p>
@@ -2849,7 +2849,7 @@
           <a:p>
             <a:fld id="{7A5DC5CD-0095-2046-BF3C-100069736801}" type="datetimeFigureOut">
               <a:rPr lang="en-US" smtClean="0"/>
-              <a:t>9/5/24</a:t>
+              <a:t>9/14/24</a:t>
             </a:fld>
             <a:endParaRPr lang="en-US"/>
           </a:p>
@@ -3137,7 +3137,7 @@
           <a:p>
             <a:fld id="{7A5DC5CD-0095-2046-BF3C-100069736801}" type="datetimeFigureOut">
               <a:rPr lang="en-US" smtClean="0"/>
-              <a:t>9/5/24</a:t>
+              <a:t>9/14/24</a:t>
             </a:fld>
             <a:endParaRPr lang="en-US"/>
           </a:p>
@@ -3378,7 +3378,7 @@
           <a:p>
             <a:fld id="{7A5DC5CD-0095-2046-BF3C-100069736801}" type="datetimeFigureOut">
               <a:rPr lang="en-US" smtClean="0"/>
-              <a:t>9/5/24</a:t>
+              <a:t>9/14/24</a:t>
             </a:fld>
             <a:endParaRPr lang="en-US"/>
           </a:p>
@@ -4565,6 +4565,36 @@
           <a:chExt cx="0" cy="0"/>
         </a:xfrm>
       </p:grpSpPr>
+      <p:pic>
+        <p:nvPicPr>
+          <p:cNvPr id="16" name="Picture 15" descr="A black text on a white background&#10;&#10;Description automatically generated">
+            <a:extLst>
+              <a:ext uri="{FF2B5EF4-FFF2-40B4-BE49-F238E27FC236}">
+                <a16:creationId xmlns:a16="http://schemas.microsoft.com/office/drawing/2014/main" id="{09D2296F-2ED2-269F-F48E-CBFBEF84AB88}"/>
+              </a:ext>
+            </a:extLst>
+          </p:cNvPr>
+          <p:cNvPicPr>
+            <a:picLocks noChangeAspect="1"/>
+          </p:cNvPicPr>
+          <p:nvPr/>
+        </p:nvPicPr>
+        <p:blipFill>
+          <a:blip r:embed="rId2"/>
+          <a:stretch>
+            <a:fillRect/>
+          </a:stretch>
+        </p:blipFill>
+        <p:spPr>
+          <a:xfrm>
+            <a:off x="9574022" y="6138164"/>
+            <a:ext cx="2578100" cy="698500"/>
+          </a:xfrm>
+          <a:prstGeom prst="rect">
+            <a:avLst/>
+          </a:prstGeom>
+        </p:spPr>
+      </p:pic>
       <p:sp>
         <p:nvSpPr>
           <p:cNvPr id="2" name="TextBox 1">
@@ -4618,8 +4648,8 @@
         </p:nvSpPr>
         <p:spPr>
           <a:xfrm>
-            <a:off x="567827" y="1058607"/>
-            <a:ext cx="10972532" cy="5235087"/>
+            <a:off x="567827" y="924495"/>
+            <a:ext cx="10825103" cy="5265352"/>
           </a:xfrm>
           <a:prstGeom prst="rect">
             <a:avLst/>
@@ -4652,7 +4682,7 @@
                 <a:latin typeface="Arial" panose="020B0604020202020204" pitchFamily="34" charset="0"/>
                 <a:ea typeface="Times New Roman" panose="02020603050405020304" pitchFamily="18" charset="0"/>
               </a:rPr>
-              <a:t>STEP 1: </a:t>
+              <a:t>STEP 4: </a:t>
             </a:r>
             <a:r>
               <a:rPr lang="en-US" sz="1800" b="1" dirty="0">
@@ -4660,16 +4690,18 @@
                 <a:latin typeface="Arial" panose="020B0604020202020204" pitchFamily="34" charset="0"/>
                 <a:ea typeface="Times New Roman" panose="02020603050405020304" pitchFamily="18" charset="0"/>
               </a:rPr>
-              <a:t>Launch the MPLAB X IDE</a:t>
-            </a:r>
-            <a:endParaRPr lang="en-US" sz="1800" dirty="0">
-              <a:effectLst/>
-              <a:latin typeface="Arial" panose="020B0604020202020204" pitchFamily="34" charset="0"/>
-              <a:ea typeface="Times New Roman" panose="02020603050405020304" pitchFamily="18" charset="0"/>
-            </a:endParaRPr>
-          </a:p>
-          <a:p>
-            <a:pPr marL="457200" marR="0" indent="-457200">
+              <a:t>Program the </a:t>
+            </a:r>
+            <a:r>
+              <a:rPr lang="en-US" b="1" dirty="0">
+                <a:latin typeface="Arial" panose="020B0604020202020204" pitchFamily="34" charset="0"/>
+                <a:ea typeface="Times New Roman" panose="02020603050405020304" pitchFamily="18" charset="0"/>
+              </a:rPr>
+              <a:t>WBZ451PE Module</a:t>
+            </a:r>
+          </a:p>
+          <a:p>
+            <a:pPr marR="0">
               <a:lnSpc>
                 <a:spcPct val="107000"/>
               </a:lnSpc>
@@ -4681,95 +4713,66 @@
               </a:spcAft>
             </a:pPr>
             <a:r>
-              <a:rPr lang="en-US" sz="1800" b="1" dirty="0">
-                <a:solidFill>
-                  <a:srgbClr val="FF0000"/>
-                </a:solidFill>
+              <a:rPr lang="en-US" dirty="0">
                 <a:effectLst/>
                 <a:latin typeface="Arial" panose="020B0604020202020204" pitchFamily="34" charset="0"/>
                 <a:ea typeface="Times New Roman" panose="02020603050405020304" pitchFamily="18" charset="0"/>
               </a:rPr>
-              <a:t>STEP 2: </a:t>
-            </a:r>
-            <a:r>
-              <a:rPr lang="en-US" sz="1800" b="1" dirty="0">
+              <a:t>a) Click on the </a:t>
+            </a:r>
+            <a:r>
+              <a:rPr lang="en-US" b="1" dirty="0">
                 <a:effectLst/>
                 <a:latin typeface="Arial" panose="020B0604020202020204" pitchFamily="34" charset="0"/>
                 <a:ea typeface="Times New Roman" panose="02020603050405020304" pitchFamily="18" charset="0"/>
               </a:rPr>
-              <a:t>Open the Demo Project</a:t>
-            </a:r>
-            <a:endParaRPr lang="en-US" sz="1800" dirty="0">
-              <a:effectLst/>
-              <a:latin typeface="Arial" panose="020B0604020202020204" pitchFamily="34" charset="0"/>
-              <a:ea typeface="Times New Roman" panose="02020603050405020304" pitchFamily="18" charset="0"/>
-            </a:endParaRPr>
-          </a:p>
-          <a:p>
-            <a:pPr marL="690245" marR="0" indent="-342900">
-              <a:lnSpc>
-                <a:spcPct val="107000"/>
-              </a:lnSpc>
-              <a:spcBef>
-                <a:spcPts val="1200"/>
-              </a:spcBef>
-              <a:spcAft>
-                <a:spcPts val="600"/>
-              </a:spcAft>
-              <a:buFont typeface="+mj-lt"/>
-              <a:buAutoNum type="alphaLcParenR"/>
-            </a:pPr>
-            <a:r>
-              <a:rPr lang="en-US" sz="1800" dirty="0">
+              <a:t>Make and Program Device Main Project</a:t>
+            </a:r>
+            <a:r>
+              <a:rPr lang="en-US" dirty="0">
                 <a:effectLst/>
                 <a:latin typeface="Arial" panose="020B0604020202020204" pitchFamily="34" charset="0"/>
                 <a:ea typeface="Times New Roman" panose="02020603050405020304" pitchFamily="18" charset="0"/>
               </a:rPr>
-              <a:t>From the MPLAB X main toolbar, select [File </a:t>
-            </a:r>
-            <a:r>
-              <a:rPr lang="en-US" sz="1800" dirty="0">
-                <a:effectLst/>
-                <a:latin typeface="Arial" panose="020B0604020202020204" pitchFamily="34" charset="0"/>
-                <a:ea typeface="Times New Roman" panose="02020603050405020304" pitchFamily="18" charset="0"/>
-                <a:sym typeface="Wingdings" pitchFamily="2" charset="2"/>
-              </a:rPr>
-              <a:t></a:t>
-            </a:r>
-            <a:r>
-              <a:rPr lang="en-US" sz="1800" dirty="0">
+              <a:t> icon in the MPLAB X main toolbar</a:t>
+            </a:r>
+          </a:p>
+          <a:p>
+            <a:endParaRPr lang="en-US" dirty="0"/>
+          </a:p>
+          <a:p>
+            <a:endParaRPr lang="en-US" dirty="0"/>
+          </a:p>
+          <a:p>
+            <a:endParaRPr lang="en-US" dirty="0"/>
+          </a:p>
+          <a:p>
+            <a:r>
+              <a:rPr lang="en-US" dirty="0">
                 <a:effectLst/>
                 <a:latin typeface="Arial" panose="020B0604020202020204" pitchFamily="34" charset="0"/>
                 <a:ea typeface="Times New Roman" panose="02020603050405020304" pitchFamily="18" charset="0"/>
               </a:rPr>
-              <a:t> Open Project]</a:t>
-            </a:r>
-          </a:p>
-          <a:p>
-            <a:pPr marL="690245" marR="0" indent="-342900">
-              <a:lnSpc>
-                <a:spcPct val="107000"/>
-              </a:lnSpc>
-              <a:spcBef>
-                <a:spcPts val="1200"/>
-              </a:spcBef>
-              <a:spcAft>
-                <a:spcPts val="600"/>
-              </a:spcAft>
-              <a:buFont typeface="+mj-lt"/>
-              <a:buAutoNum type="alphaLcParenR"/>
-            </a:pPr>
-            <a:r>
-              <a:rPr lang="en-US" sz="1800" dirty="0">
-                <a:effectLst/>
-                <a:latin typeface="Arial" panose="020B0604020202020204" pitchFamily="34" charset="0"/>
-                <a:ea typeface="Times New Roman" panose="02020603050405020304" pitchFamily="18" charset="0"/>
-              </a:rPr>
-              <a:t>Navigate to the location of the demo project folder:</a:t>
-            </a:r>
-          </a:p>
-          <a:p>
-            <a:pPr marL="804545" lvl="1">
+              <a:t>b) Verify that the programming phase was successful</a:t>
+            </a:r>
+          </a:p>
+          <a:p>
+            <a:endParaRPr lang="en-US" dirty="0"/>
+          </a:p>
+          <a:p>
+            <a:endParaRPr lang="en-US" dirty="0"/>
+          </a:p>
+          <a:p>
+            <a:endParaRPr lang="en-US" dirty="0"/>
+          </a:p>
+          <a:p>
+            <a:endParaRPr lang="en-US" dirty="0"/>
+          </a:p>
+          <a:p>
+            <a:endParaRPr lang="en-US" dirty="0"/>
+          </a:p>
+          <a:p>
+            <a:pPr marL="575945" marR="0" indent="-575945">
               <a:lnSpc>
                 <a:spcPct val="107000"/>
               </a:lnSpc>
@@ -4781,119 +4784,15 @@
               </a:spcAft>
             </a:pPr>
             <a:r>
-              <a:rPr lang="en-US" sz="1600" b="1" dirty="0">
+              <a:rPr lang="en-US" sz="1800" b="1" dirty="0">
+                <a:solidFill>
+                  <a:srgbClr val="FF0000"/>
+                </a:solidFill>
                 <a:effectLst/>
                 <a:latin typeface="Arial" panose="020B0604020202020204" pitchFamily="34" charset="0"/>
                 <a:ea typeface="Times New Roman" panose="02020603050405020304" pitchFamily="18" charset="0"/>
               </a:rPr>
-              <a:t>pic32cxbz2_wbz45x_ble_can_bridge </a:t>
-            </a:r>
-            <a:r>
-              <a:rPr lang="en-US" sz="1600" b="1" dirty="0">
-                <a:effectLst/>
-                <a:latin typeface="Arial" panose="020B0604020202020204" pitchFamily="34" charset="0"/>
-                <a:ea typeface="Times New Roman" panose="02020603050405020304" pitchFamily="18" charset="0"/>
-                <a:sym typeface="Wingdings" pitchFamily="2" charset="2"/>
-              </a:rPr>
-              <a:t> </a:t>
-            </a:r>
-            <a:r>
-              <a:rPr lang="en-US" sz="1600" b="1" dirty="0">
-                <a:effectLst/>
-                <a:latin typeface="Arial" panose="020B0604020202020204" pitchFamily="34" charset="0"/>
-                <a:ea typeface="Times New Roman" panose="02020603050405020304" pitchFamily="18" charset="0"/>
-              </a:rPr>
-              <a:t>02_wbz451_mcp251863_CAN_BLE_Peripheral</a:t>
-            </a:r>
-            <a:r>
-              <a:rPr lang="en-US" sz="1600" b="1" dirty="0">
-                <a:latin typeface="Arial" panose="020B0604020202020204" pitchFamily="34" charset="0"/>
-                <a:ea typeface="Times New Roman" panose="02020603050405020304" pitchFamily="18" charset="0"/>
-              </a:rPr>
-              <a:t> </a:t>
-            </a:r>
-            <a:r>
-              <a:rPr lang="en-US" sz="1600" b="1" dirty="0">
-                <a:latin typeface="Arial" panose="020B0604020202020204" pitchFamily="34" charset="0"/>
-                <a:ea typeface="Times New Roman" panose="02020603050405020304" pitchFamily="18" charset="0"/>
-                <a:sym typeface="Wingdings" pitchFamily="2" charset="2"/>
-              </a:rPr>
-              <a:t> </a:t>
-            </a:r>
-            <a:r>
-              <a:rPr lang="en-US" sz="1600" b="1" dirty="0">
-                <a:effectLst/>
-                <a:latin typeface="Arial" panose="020B0604020202020204" pitchFamily="34" charset="0"/>
-                <a:ea typeface="Times New Roman" panose="02020603050405020304" pitchFamily="18" charset="0"/>
-              </a:rPr>
-              <a:t>firmware</a:t>
-            </a:r>
-            <a:endParaRPr lang="en-US" sz="1600" dirty="0">
-              <a:effectLst/>
-              <a:latin typeface="Arial" panose="020B0604020202020204" pitchFamily="34" charset="0"/>
-              <a:ea typeface="Times New Roman" panose="02020603050405020304" pitchFamily="18" charset="0"/>
-            </a:endParaRPr>
-          </a:p>
-          <a:p>
-            <a:pPr marL="690245" marR="0" indent="-342900">
-              <a:lnSpc>
-                <a:spcPct val="107000"/>
-              </a:lnSpc>
-              <a:spcBef>
-                <a:spcPts val="1200"/>
-              </a:spcBef>
-              <a:spcAft>
-                <a:spcPts val="600"/>
-              </a:spcAft>
-              <a:buFont typeface="+mj-lt"/>
-              <a:buAutoNum type="alphaLcParenR"/>
-            </a:pPr>
-            <a:r>
-              <a:rPr lang="en-US" sz="1800" dirty="0">
-                <a:effectLst/>
-                <a:latin typeface="Arial" panose="020B0604020202020204" pitchFamily="34" charset="0"/>
-                <a:ea typeface="Times New Roman" panose="02020603050405020304" pitchFamily="18" charset="0"/>
-              </a:rPr>
-              <a:t>Select (click on) the </a:t>
-            </a:r>
-            <a:r>
-              <a:rPr lang="en-US" sz="1800" b="1" dirty="0" err="1">
-                <a:effectLst/>
-                <a:latin typeface="Arial" panose="020B0604020202020204" pitchFamily="34" charset="0"/>
-                <a:ea typeface="Times New Roman" panose="02020603050405020304" pitchFamily="18" charset="0"/>
-              </a:rPr>
-              <a:t>bleCan_Peripheral.X</a:t>
-            </a:r>
-            <a:r>
-              <a:rPr lang="en-US" sz="1800" dirty="0">
-                <a:effectLst/>
-                <a:latin typeface="Arial" panose="020B0604020202020204" pitchFamily="34" charset="0"/>
-                <a:ea typeface="Times New Roman" panose="02020603050405020304" pitchFamily="18" charset="0"/>
-              </a:rPr>
-              <a:t> project folder</a:t>
-            </a:r>
-          </a:p>
-          <a:p>
-            <a:pPr marL="690245" marR="0" indent="-342900">
-              <a:lnSpc>
-                <a:spcPct val="107000"/>
-              </a:lnSpc>
-              <a:spcBef>
-                <a:spcPts val="1200"/>
-              </a:spcBef>
-              <a:spcAft>
-                <a:spcPts val="600"/>
-              </a:spcAft>
-              <a:buFont typeface="+mj-lt"/>
-              <a:buAutoNum type="alphaLcParenR"/>
-            </a:pPr>
-            <a:r>
-              <a:rPr lang="en-US" sz="1800" dirty="0">
-                <a:effectLst/>
-                <a:latin typeface="Arial" panose="020B0604020202020204" pitchFamily="34" charset="0"/>
-                <a:ea typeface="Times New Roman" panose="02020603050405020304" pitchFamily="18" charset="0"/>
-              </a:rPr>
-              <a:t>Click on the </a:t>
+              <a:t>STEP 5: </a:t>
             </a:r>
             <a:r>
               <a:rPr lang="en-US" sz="1800" b="1" dirty="0">
@@ -4901,19 +4800,31 @@
                 <a:latin typeface="Arial" panose="020B0604020202020204" pitchFamily="34" charset="0"/>
                 <a:ea typeface="Times New Roman" panose="02020603050405020304" pitchFamily="18" charset="0"/>
               </a:rPr>
-              <a:t>Open Project </a:t>
-            </a:r>
-            <a:r>
-              <a:rPr lang="en-US" sz="1800" dirty="0">
+              <a:t>Connect to the </a:t>
+            </a:r>
+            <a:r>
+              <a:rPr lang="en-US" b="1" dirty="0">
+                <a:latin typeface="Arial" panose="020B0604020202020204" pitchFamily="34" charset="0"/>
+                <a:ea typeface="Times New Roman" panose="02020603050405020304" pitchFamily="18" charset="0"/>
+              </a:rPr>
+              <a:t>WBZ451</a:t>
+            </a:r>
+            <a:r>
+              <a:rPr lang="en-US" sz="1800" b="1" dirty="0">
                 <a:effectLst/>
                 <a:latin typeface="Arial" panose="020B0604020202020204" pitchFamily="34" charset="0"/>
                 <a:ea typeface="Times New Roman" panose="02020603050405020304" pitchFamily="18" charset="0"/>
               </a:rPr>
-              <a:t>button</a:t>
-            </a:r>
-          </a:p>
-          <a:p>
-            <a:pPr marL="457200" marR="0" indent="-457200">
+              <a:t> Module Using the Microchip Bluetooth Data (MBD) Application</a:t>
+            </a:r>
+            <a:endParaRPr lang="en-US" sz="1800" dirty="0">
+              <a:effectLst/>
+              <a:latin typeface="Arial" panose="020B0604020202020204" pitchFamily="34" charset="0"/>
+              <a:ea typeface="Times New Roman" panose="02020603050405020304" pitchFamily="18" charset="0"/>
+            </a:endParaRPr>
+          </a:p>
+          <a:p>
+            <a:pPr marL="1033145" marR="0" indent="-575945">
               <a:lnSpc>
                 <a:spcPct val="107000"/>
               </a:lnSpc>
@@ -4925,32 +4836,16 @@
               </a:spcAft>
             </a:pPr>
             <a:r>
-              <a:rPr lang="en-US" sz="1800" b="1" dirty="0">
-                <a:solidFill>
-                  <a:srgbClr val="FF0000"/>
-                </a:solidFill>
+              <a:rPr lang="en-US" sz="1800" dirty="0">
                 <a:effectLst/>
                 <a:latin typeface="Arial" panose="020B0604020202020204" pitchFamily="34" charset="0"/>
                 <a:ea typeface="Times New Roman" panose="02020603050405020304" pitchFamily="18" charset="0"/>
               </a:rPr>
-              <a:t>STEP 3: </a:t>
-            </a:r>
-            <a:r>
-              <a:rPr lang="en-US" sz="1800" b="1" dirty="0">
-                <a:effectLst/>
-                <a:latin typeface="Arial" panose="020B0604020202020204" pitchFamily="34" charset="0"/>
-                <a:ea typeface="Times New Roman" panose="02020603050405020304" pitchFamily="18" charset="0"/>
-              </a:rPr>
-              <a:t>Clean and Build the Project</a:t>
-            </a:r>
-            <a:endParaRPr lang="en-US" sz="1800" dirty="0">
-              <a:effectLst/>
-              <a:latin typeface="Arial" panose="020B0604020202020204" pitchFamily="34" charset="0"/>
-              <a:ea typeface="Times New Roman" panose="02020603050405020304" pitchFamily="18" charset="0"/>
-            </a:endParaRPr>
-          </a:p>
-          <a:p>
-            <a:pPr marL="923290" marR="0" indent="-575945">
+              <a:t>Follow the procedure in the section titled “Connecting CAN Network to Mobile App (MBD App)”</a:t>
+            </a:r>
+          </a:p>
+          <a:p>
+            <a:pPr marL="457200" marR="0">
               <a:lnSpc>
                 <a:spcPct val="107000"/>
               </a:lnSpc>
@@ -4962,44 +4857,34 @@
               </a:spcAft>
             </a:pPr>
             <a:r>
-              <a:rPr lang="en-US" sz="1800" dirty="0">
+              <a:rPr lang="en-US" sz="1800" u="sng" dirty="0">
+                <a:solidFill>
+                  <a:srgbClr val="0000FF"/>
+                </a:solidFill>
                 <a:effectLst/>
                 <a:latin typeface="Arial" panose="020B0604020202020204" pitchFamily="34" charset="0"/>
                 <a:ea typeface="Times New Roman" panose="02020603050405020304" pitchFamily="18" charset="0"/>
+                <a:hlinkClick r:id="rId3"/>
               </a:rPr>
-              <a:t>Click on the </a:t>
-            </a:r>
-            <a:r>
-              <a:rPr lang="en-US" sz="1800" b="1" dirty="0">
-                <a:effectLst/>
-                <a:latin typeface="Arial" panose="020B0604020202020204" pitchFamily="34" charset="0"/>
-                <a:ea typeface="Times New Roman" panose="02020603050405020304" pitchFamily="18" charset="0"/>
-              </a:rPr>
-              <a:t>Clean and Build Main Project</a:t>
-            </a:r>
-            <a:r>
-              <a:rPr lang="en-US" sz="1800" dirty="0">
-                <a:effectLst/>
-                <a:latin typeface="Arial" panose="020B0604020202020204" pitchFamily="34" charset="0"/>
-                <a:ea typeface="Times New Roman" panose="02020603050405020304" pitchFamily="18" charset="0"/>
-              </a:rPr>
-              <a:t> icon in the MPLAB X main toolbar</a:t>
-            </a:r>
-          </a:p>
-          <a:p>
-            <a:endParaRPr lang="en-US" sz="2000" dirty="0"/>
-          </a:p>
-          <a:p>
-            <a:endParaRPr lang="en-US" dirty="0"/>
+              <a:t>https://github.com/MicrochipTech/pic32cxbz2_wbz45x_ble_can_bridge/tree/main?tab=readme-ov-file#connecting-can-network-to-mobile-app-mbd-app</a:t>
+            </a:r>
+            <a:endParaRPr lang="en-US" sz="1800" u="sng" dirty="0">
+              <a:solidFill>
+                <a:srgbClr val="0000FF"/>
+              </a:solidFill>
+              <a:effectLst/>
+              <a:latin typeface="Arial" panose="020B0604020202020204" pitchFamily="34" charset="0"/>
+              <a:ea typeface="Times New Roman" panose="02020603050405020304" pitchFamily="18" charset="0"/>
+            </a:endParaRPr>
           </a:p>
         </p:txBody>
       </p:sp>
       <p:pic>
         <p:nvPicPr>
-          <p:cNvPr id="7" name="Picture 6" descr="Graphical user interface, text, application, chat or text message&#10;&#10;Description automatically generated">
-            <a:extLst>
-              <a:ext uri="{FF2B5EF4-FFF2-40B4-BE49-F238E27FC236}">
-                <a16:creationId xmlns:a16="http://schemas.microsoft.com/office/drawing/2014/main" id="{CAF2B978-8883-E4D9-D5E8-30E33767B60A}"/>
+          <p:cNvPr id="12" name="Picture 11">
+            <a:extLst>
+              <a:ext uri="{FF2B5EF4-FFF2-40B4-BE49-F238E27FC236}">
+                <a16:creationId xmlns:a16="http://schemas.microsoft.com/office/drawing/2014/main" id="{D9E6BC65-EB56-D818-B151-9B574C0E044E}"/>
               </a:ext>
             </a:extLst>
           </p:cNvPr>
@@ -5009,7 +4894,7 @@
           <p:nvPr/>
         </p:nvPicPr>
         <p:blipFill>
-          <a:blip r:embed="rId2">
+          <a:blip r:embed="rId4" cstate="print">
             <a:extLst>
               <a:ext uri="{28A0092B-C50C-407E-A947-70E740481C1C}">
                 <a14:useLocalDpi xmlns:a14="http://schemas.microsoft.com/office/drawing/2010/main" val="0"/>
@@ -5022,8 +4907,8 @@
         </p:blipFill>
         <p:spPr>
           <a:xfrm>
-            <a:off x="1636949" y="5182413"/>
-            <a:ext cx="5156200" cy="1409700"/>
+            <a:off x="921395" y="3069463"/>
+            <a:ext cx="6492240" cy="1240790"/>
           </a:xfrm>
           <a:prstGeom prst="rect">
             <a:avLst/>
@@ -5032,6 +4917,98 @@
       </p:pic>
       <p:sp>
         <p:nvSpPr>
+          <p:cNvPr id="13" name="Oval 12">
+            <a:extLst>
+              <a:ext uri="{FF2B5EF4-FFF2-40B4-BE49-F238E27FC236}">
+                <a16:creationId xmlns:a16="http://schemas.microsoft.com/office/drawing/2014/main" id="{21B42215-9A7F-E16D-440F-F484B967DA5E}"/>
+              </a:ext>
+            </a:extLst>
+          </p:cNvPr>
+          <p:cNvSpPr/>
+          <p:nvPr/>
+        </p:nvSpPr>
+        <p:spPr>
+          <a:xfrm>
+            <a:off x="909203" y="3938599"/>
+            <a:ext cx="1600200" cy="190500"/>
+          </a:xfrm>
+          <a:prstGeom prst="ellipse">
+            <a:avLst/>
+          </a:prstGeom>
+          <a:noFill/>
+          <a:ln>
+            <a:solidFill>
+              <a:srgbClr val="FF0000"/>
+            </a:solidFill>
+          </a:ln>
+        </p:spPr>
+        <p:style>
+          <a:lnRef idx="2">
+            <a:schemeClr val="accent1">
+              <a:shade val="50000"/>
+            </a:schemeClr>
+          </a:lnRef>
+          <a:fillRef idx="1">
+            <a:schemeClr val="accent1"/>
+          </a:fillRef>
+          <a:effectRef idx="0">
+            <a:schemeClr val="accent1"/>
+          </a:effectRef>
+          <a:fontRef idx="minor">
+            <a:schemeClr val="lt1"/>
+          </a:fontRef>
+        </p:style>
+        <p:txBody>
+          <a:bodyPr rot="0" spcFirstLastPara="0" vert="horz" wrap="square" lIns="91440" tIns="45720" rIns="91440" bIns="45720" numCol="1" spcCol="0" rtlCol="0" fromWordArt="0" anchor="ctr" anchorCtr="0" forceAA="0" compatLnSpc="1">
+            <a:prstTxWarp prst="textNoShape">
+              <a:avLst/>
+            </a:prstTxWarp>
+            <a:noAutofit/>
+          </a:bodyPr>
+          <a:lstStyle/>
+          <a:p>
+            <a:endParaRPr lang="en-US"/>
+          </a:p>
+        </p:txBody>
+      </p:sp>
+      <p:pic>
+        <p:nvPicPr>
+          <p:cNvPr id="14" name="Picture 13" descr="Graphical user interface, text, application, chat or text message&#10;&#10;Description automatically generated">
+            <a:extLst>
+              <a:ext uri="{FF2B5EF4-FFF2-40B4-BE49-F238E27FC236}">
+                <a16:creationId xmlns:a16="http://schemas.microsoft.com/office/drawing/2014/main" id="{E98177C4-8C57-02A0-A234-117E41937837}"/>
+              </a:ext>
+            </a:extLst>
+          </p:cNvPr>
+          <p:cNvPicPr>
+            <a:picLocks noChangeAspect="1"/>
+          </p:cNvPicPr>
+          <p:nvPr/>
+        </p:nvPicPr>
+        <p:blipFill>
+          <a:blip r:embed="rId5">
+            <a:extLst>
+              <a:ext uri="{28A0092B-C50C-407E-A947-70E740481C1C}">
+                <a14:useLocalDpi xmlns:a14="http://schemas.microsoft.com/office/drawing/2010/main" val="0"/>
+              </a:ext>
+            </a:extLst>
+          </a:blip>
+          <a:stretch>
+            <a:fillRect/>
+          </a:stretch>
+        </p:blipFill>
+        <p:spPr>
+          <a:xfrm>
+            <a:off x="6618986" y="1813433"/>
+            <a:ext cx="3416300" cy="1256030"/>
+          </a:xfrm>
+          <a:prstGeom prst="rect">
+            <a:avLst/>
+          </a:prstGeom>
+        </p:spPr>
+      </p:pic>
+      <p:sp>
+        <p:nvSpPr>
           <p:cNvPr id="8" name="Right Arrow 7">
             <a:extLst>
               <a:ext uri="{FF2B5EF4-FFF2-40B4-BE49-F238E27FC236}">
@@ -5044,7 +5021,7 @@
         </p:nvSpPr>
         <p:spPr>
           <a:xfrm>
-            <a:off x="936440" y="5240592"/>
+            <a:off x="5899860" y="1792097"/>
             <a:ext cx="838200" cy="558800"/>
           </a:xfrm>
           <a:prstGeom prst="rightArrow">
@@ -5091,7 +5068,7 @@
               </a:spcAft>
             </a:pPr>
             <a:r>
-              <a:rPr lang="en-US" sz="1200">
+              <a:rPr lang="en-US" sz="1200" dirty="0">
                 <a:solidFill>
                   <a:srgbClr val="FFFF00"/>
                 </a:solidFill>
@@ -5101,7 +5078,7 @@
               </a:rPr>
               <a:t>CLICK</a:t>
             </a:r>
-            <a:endParaRPr lang="en-US" sz="1100">
+            <a:endParaRPr lang="en-US" sz="1100" dirty="0">
               <a:effectLst/>
               <a:latin typeface="Arial" panose="020B0604020202020204" pitchFamily="34" charset="0"/>
               <a:ea typeface="Times New Roman" panose="02020603050405020304" pitchFamily="18" charset="0"/>
@@ -5109,40 +5086,89 @@
           </a:p>
         </p:txBody>
       </p:sp>
-      <p:pic>
-        <p:nvPicPr>
-          <p:cNvPr id="9" name="Picture 8" descr="A black text on a white background&#10;&#10;Description automatically generated">
-            <a:extLst>
-              <a:ext uri="{FF2B5EF4-FFF2-40B4-BE49-F238E27FC236}">
-                <a16:creationId xmlns:a16="http://schemas.microsoft.com/office/drawing/2014/main" id="{00FBCB51-BC78-FECA-56D9-295883A977E3}"/>
-              </a:ext>
-            </a:extLst>
-          </p:cNvPr>
-          <p:cNvPicPr>
-            <a:picLocks noChangeAspect="1"/>
-          </p:cNvPicPr>
-          <p:nvPr/>
-        </p:nvPicPr>
-        <p:blipFill>
-          <a:blip r:embed="rId3"/>
-          <a:stretch>
-            <a:fillRect/>
-          </a:stretch>
-        </p:blipFill>
-        <p:spPr>
-          <a:xfrm>
-            <a:off x="9574022" y="6138164"/>
-            <a:ext cx="2578100" cy="698500"/>
-          </a:xfrm>
-          <a:prstGeom prst="rect">
-            <a:avLst/>
-          </a:prstGeom>
-        </p:spPr>
-      </p:pic>
+      <p:sp>
+        <p:nvSpPr>
+          <p:cNvPr id="15" name="Right Arrow 14">
+            <a:extLst>
+              <a:ext uri="{FF2B5EF4-FFF2-40B4-BE49-F238E27FC236}">
+                <a16:creationId xmlns:a16="http://schemas.microsoft.com/office/drawing/2014/main" id="{436FC1E8-E169-CE20-60DE-14759E49973B}"/>
+              </a:ext>
+            </a:extLst>
+          </p:cNvPr>
+          <p:cNvSpPr/>
+          <p:nvPr/>
+        </p:nvSpPr>
+        <p:spPr>
+          <a:xfrm>
+            <a:off x="201278" y="5497880"/>
+            <a:ext cx="838200" cy="558800"/>
+          </a:xfrm>
+          <a:prstGeom prst="rightArrow">
+            <a:avLst/>
+          </a:prstGeom>
+          <a:solidFill>
+            <a:srgbClr val="FF0000"/>
+          </a:solidFill>
+        </p:spPr>
+        <p:style>
+          <a:lnRef idx="2">
+            <a:schemeClr val="accent1">
+              <a:shade val="50000"/>
+            </a:schemeClr>
+          </a:lnRef>
+          <a:fillRef idx="1">
+            <a:schemeClr val="accent1"/>
+          </a:fillRef>
+          <a:effectRef idx="0">
+            <a:schemeClr val="accent1"/>
+          </a:effectRef>
+          <a:fontRef idx="minor">
+            <a:schemeClr val="lt1"/>
+          </a:fontRef>
+        </p:style>
+        <p:txBody>
+          <a:bodyPr rot="0" spcFirstLastPara="0" vert="horz" wrap="square" lIns="91440" tIns="45720" rIns="91440" bIns="45720" numCol="1" spcCol="0" rtlCol="0" fromWordArt="0" anchor="ctr" anchorCtr="0" forceAA="0" compatLnSpc="1">
+            <a:prstTxWarp prst="textNoShape">
+              <a:avLst/>
+            </a:prstTxWarp>
+            <a:noAutofit/>
+          </a:bodyPr>
+          <a:lstStyle/>
+          <a:p>
+            <a:pPr marL="0" marR="0" algn="ctr">
+              <a:lnSpc>
+                <a:spcPct val="107000"/>
+              </a:lnSpc>
+              <a:spcBef>
+                <a:spcPts val="0"/>
+              </a:spcBef>
+              <a:spcAft>
+                <a:spcPts val="800"/>
+              </a:spcAft>
+            </a:pPr>
+            <a:r>
+              <a:rPr lang="en-US" sz="1200" dirty="0">
+                <a:solidFill>
+                  <a:srgbClr val="FFFF00"/>
+                </a:solidFill>
+                <a:effectLst/>
+                <a:latin typeface="Arial" panose="020B0604020202020204" pitchFamily="34" charset="0"/>
+                <a:ea typeface="Times New Roman" panose="02020603050405020304" pitchFamily="18" charset="0"/>
+              </a:rPr>
+              <a:t>CLICK</a:t>
+            </a:r>
+            <a:endParaRPr lang="en-US" sz="1100" dirty="0">
+              <a:effectLst/>
+              <a:latin typeface="Arial" panose="020B0604020202020204" pitchFamily="34" charset="0"/>
+              <a:ea typeface="Times New Roman" panose="02020603050405020304" pitchFamily="18" charset="0"/>
+            </a:endParaRPr>
+          </a:p>
+        </p:txBody>
+      </p:sp>
     </p:spTree>
     <p:extLst>
       <p:ext uri="{BB962C8B-B14F-4D97-AF65-F5344CB8AC3E}">
-        <p14:creationId xmlns:p14="http://schemas.microsoft.com/office/powerpoint/2010/main" val="3967660036"/>
+        <p14:creationId xmlns:p14="http://schemas.microsoft.com/office/powerpoint/2010/main" val="43339631"/>
       </p:ext>
     </p:extLst>
   </p:cSld>
@@ -5171,10 +5197,10 @@
       </p:grpSpPr>
       <p:pic>
         <p:nvPicPr>
-          <p:cNvPr id="16" name="Picture 15" descr="A black text on a white background&#10;&#10;Description automatically generated">
-            <a:extLst>
-              <a:ext uri="{FF2B5EF4-FFF2-40B4-BE49-F238E27FC236}">
-                <a16:creationId xmlns:a16="http://schemas.microsoft.com/office/drawing/2014/main" id="{09D2296F-2ED2-269F-F48E-CBFBEF84AB88}"/>
+          <p:cNvPr id="7" name="Picture 6" descr="A screen shot of a computer&#10;&#10;Description automatically generated">
+            <a:extLst>
+              <a:ext uri="{FF2B5EF4-FFF2-40B4-BE49-F238E27FC236}">
+                <a16:creationId xmlns:a16="http://schemas.microsoft.com/office/drawing/2014/main" id="{A8314BBE-E4F8-9F55-81FA-C8D0CDA7C8D5}"/>
               </a:ext>
             </a:extLst>
           </p:cNvPr>
@@ -5191,6 +5217,66 @@
         </p:blipFill>
         <p:spPr>
           <a:xfrm>
+            <a:off x="1605410" y="5777280"/>
+            <a:ext cx="5435600" cy="825500"/>
+          </a:xfrm>
+          <a:prstGeom prst="rect">
+            <a:avLst/>
+          </a:prstGeom>
+        </p:spPr>
+      </p:pic>
+      <p:pic>
+        <p:nvPicPr>
+          <p:cNvPr id="5" name="Picture 4" descr="A screenshot of a computer program&#10;&#10;Description automatically generated">
+            <a:extLst>
+              <a:ext uri="{FF2B5EF4-FFF2-40B4-BE49-F238E27FC236}">
+                <a16:creationId xmlns:a16="http://schemas.microsoft.com/office/drawing/2014/main" id="{2F8930B1-144B-30CF-36E1-D8083FFD28BF}"/>
+              </a:ext>
+            </a:extLst>
+          </p:cNvPr>
+          <p:cNvPicPr>
+            <a:picLocks noChangeAspect="1"/>
+          </p:cNvPicPr>
+          <p:nvPr/>
+        </p:nvPicPr>
+        <p:blipFill>
+          <a:blip r:embed="rId3"/>
+          <a:stretch>
+            <a:fillRect/>
+          </a:stretch>
+        </p:blipFill>
+        <p:spPr>
+          <a:xfrm>
+            <a:off x="1535886" y="1300560"/>
+            <a:ext cx="3789514" cy="4054584"/>
+          </a:xfrm>
+          <a:prstGeom prst="rect">
+            <a:avLst/>
+          </a:prstGeom>
+        </p:spPr>
+      </p:pic>
+      <p:pic>
+        <p:nvPicPr>
+          <p:cNvPr id="16" name="Picture 15" descr="A black text on a white background&#10;&#10;Description automatically generated">
+            <a:extLst>
+              <a:ext uri="{FF2B5EF4-FFF2-40B4-BE49-F238E27FC236}">
+                <a16:creationId xmlns:a16="http://schemas.microsoft.com/office/drawing/2014/main" id="{09D2296F-2ED2-269F-F48E-CBFBEF84AB88}"/>
+              </a:ext>
+            </a:extLst>
+          </p:cNvPr>
+          <p:cNvPicPr>
+            <a:picLocks noChangeAspect="1"/>
+          </p:cNvPicPr>
+          <p:nvPr/>
+        </p:nvPicPr>
+        <p:blipFill>
+          <a:blip r:embed="rId4"/>
+          <a:stretch>
+            <a:fillRect/>
+          </a:stretch>
+        </p:blipFill>
+        <p:spPr>
+          <a:xfrm>
             <a:off x="9574022" y="6138164"/>
             <a:ext cx="2578100" cy="698500"/>
           </a:xfrm>
@@ -5213,7 +5299,7 @@
         </p:nvSpPr>
         <p:spPr>
           <a:xfrm>
-            <a:off x="1636949" y="184848"/>
+            <a:off x="1605410" y="196670"/>
             <a:ext cx="9495087" cy="584775"/>
           </a:xfrm>
           <a:prstGeom prst="rect">
@@ -5233,7 +5319,7 @@
                 <a:latin typeface="Arial" panose="020B0604020202020204" pitchFamily="34" charset="0"/>
                 <a:cs typeface="Arial" panose="020B0604020202020204" pitchFamily="34" charset="0"/>
               </a:rPr>
-              <a:t>Demo Procedure</a:t>
+              <a:t>Launching the Debugger</a:t>
             </a:r>
           </a:p>
         </p:txBody>
@@ -5253,7 +5339,7 @@
         <p:spPr>
           <a:xfrm>
             <a:off x="567827" y="924495"/>
-            <a:ext cx="10825103" cy="5265352"/>
+            <a:ext cx="10825103" cy="376065"/>
           </a:xfrm>
           <a:prstGeom prst="rect">
             <a:avLst/>
@@ -5286,95 +5372,204 @@
                 <a:latin typeface="Arial" panose="020B0604020202020204" pitchFamily="34" charset="0"/>
                 <a:ea typeface="Times New Roman" panose="02020603050405020304" pitchFamily="18" charset="0"/>
               </a:rPr>
-              <a:t>STEP 4: </a:t>
-            </a:r>
-            <a:r>
-              <a:rPr lang="en-US" sz="1800" b="1" dirty="0">
+              <a:t>STEP 1: </a:t>
+            </a:r>
+            <a:r>
+              <a:rPr lang="en-US" b="1" dirty="0">
+                <a:latin typeface="Arial" panose="020B0604020202020204" pitchFamily="34" charset="0"/>
+                <a:ea typeface="Times New Roman" panose="02020603050405020304" pitchFamily="18" charset="0"/>
+              </a:rPr>
+              <a:t>Erase Device Memory Main Project</a:t>
+            </a:r>
+            <a:endParaRPr lang="en-US" dirty="0"/>
+          </a:p>
+        </p:txBody>
+      </p:sp>
+      <p:sp>
+        <p:nvSpPr>
+          <p:cNvPr id="8" name="Right Arrow 7">
+            <a:extLst>
+              <a:ext uri="{FF2B5EF4-FFF2-40B4-BE49-F238E27FC236}">
+                <a16:creationId xmlns:a16="http://schemas.microsoft.com/office/drawing/2014/main" id="{7E5F9613-C9B4-A621-2173-3A49D330AB77}"/>
+              </a:ext>
+            </a:extLst>
+          </p:cNvPr>
+          <p:cNvSpPr/>
+          <p:nvPr/>
+        </p:nvSpPr>
+        <p:spPr>
+          <a:xfrm>
+            <a:off x="799070" y="2838795"/>
+            <a:ext cx="838200" cy="558800"/>
+          </a:xfrm>
+          <a:prstGeom prst="rightArrow">
+            <a:avLst/>
+          </a:prstGeom>
+          <a:solidFill>
+            <a:srgbClr val="FF0000"/>
+          </a:solidFill>
+        </p:spPr>
+        <p:style>
+          <a:lnRef idx="2">
+            <a:schemeClr val="accent1">
+              <a:shade val="50000"/>
+            </a:schemeClr>
+          </a:lnRef>
+          <a:fillRef idx="1">
+            <a:schemeClr val="accent1"/>
+          </a:fillRef>
+          <a:effectRef idx="0">
+            <a:schemeClr val="accent1"/>
+          </a:effectRef>
+          <a:fontRef idx="minor">
+            <a:schemeClr val="lt1"/>
+          </a:fontRef>
+        </p:style>
+        <p:txBody>
+          <a:bodyPr rot="0" spcFirstLastPara="0" vert="horz" wrap="square" lIns="91440" tIns="45720" rIns="91440" bIns="45720" numCol="1" spcCol="0" rtlCol="0" fromWordArt="0" anchor="ctr" anchorCtr="0" forceAA="0" compatLnSpc="1">
+            <a:prstTxWarp prst="textNoShape">
+              <a:avLst/>
+            </a:prstTxWarp>
+            <a:noAutofit/>
+          </a:bodyPr>
+          <a:lstStyle/>
+          <a:p>
+            <a:pPr marL="0" marR="0" algn="ctr">
+              <a:lnSpc>
+                <a:spcPct val="107000"/>
+              </a:lnSpc>
+              <a:spcBef>
+                <a:spcPts val="0"/>
+              </a:spcBef>
+              <a:spcAft>
+                <a:spcPts val="800"/>
+              </a:spcAft>
+            </a:pPr>
+            <a:r>
+              <a:rPr lang="en-US" sz="1200" dirty="0">
+                <a:solidFill>
+                  <a:srgbClr val="FFFF00"/>
+                </a:solidFill>
                 <a:effectLst/>
                 <a:latin typeface="Arial" panose="020B0604020202020204" pitchFamily="34" charset="0"/>
                 <a:ea typeface="Times New Roman" panose="02020603050405020304" pitchFamily="18" charset="0"/>
               </a:rPr>
-              <a:t>Program the </a:t>
-            </a:r>
-            <a:r>
-              <a:rPr lang="en-US" b="1" dirty="0">
-                <a:latin typeface="Arial" panose="020B0604020202020204" pitchFamily="34" charset="0"/>
-                <a:ea typeface="Times New Roman" panose="02020603050405020304" pitchFamily="18" charset="0"/>
-              </a:rPr>
-              <a:t>WBZ451PE Module</a:t>
-            </a:r>
-          </a:p>
-          <a:p>
-            <a:pPr marR="0">
+              <a:t>CLICK</a:t>
+            </a:r>
+            <a:endParaRPr lang="en-US" sz="1100" dirty="0">
+              <a:effectLst/>
+              <a:latin typeface="Arial" panose="020B0604020202020204" pitchFamily="34" charset="0"/>
+              <a:ea typeface="Times New Roman" panose="02020603050405020304" pitchFamily="18" charset="0"/>
+            </a:endParaRPr>
+          </a:p>
+        </p:txBody>
+      </p:sp>
+      <p:sp>
+        <p:nvSpPr>
+          <p:cNvPr id="15" name="Right Arrow 14">
+            <a:extLst>
+              <a:ext uri="{FF2B5EF4-FFF2-40B4-BE49-F238E27FC236}">
+                <a16:creationId xmlns:a16="http://schemas.microsoft.com/office/drawing/2014/main" id="{436FC1E8-E169-CE20-60DE-14759E49973B}"/>
+              </a:ext>
+            </a:extLst>
+          </p:cNvPr>
+          <p:cNvSpPr/>
+          <p:nvPr/>
+        </p:nvSpPr>
+        <p:spPr>
+          <a:xfrm>
+            <a:off x="871103" y="6009951"/>
+            <a:ext cx="838200" cy="558800"/>
+          </a:xfrm>
+          <a:prstGeom prst="rightArrow">
+            <a:avLst/>
+          </a:prstGeom>
+          <a:solidFill>
+            <a:srgbClr val="FF0000"/>
+          </a:solidFill>
+        </p:spPr>
+        <p:style>
+          <a:lnRef idx="2">
+            <a:schemeClr val="accent1">
+              <a:shade val="50000"/>
+            </a:schemeClr>
+          </a:lnRef>
+          <a:fillRef idx="1">
+            <a:schemeClr val="accent1"/>
+          </a:fillRef>
+          <a:effectRef idx="0">
+            <a:schemeClr val="accent1"/>
+          </a:effectRef>
+          <a:fontRef idx="minor">
+            <a:schemeClr val="lt1"/>
+          </a:fontRef>
+        </p:style>
+        <p:txBody>
+          <a:bodyPr rot="0" spcFirstLastPara="0" vert="horz" wrap="square" lIns="91440" tIns="45720" rIns="91440" bIns="45720" numCol="1" spcCol="0" rtlCol="0" fromWordArt="0" anchor="ctr" anchorCtr="0" forceAA="0" compatLnSpc="1">
+            <a:prstTxWarp prst="textNoShape">
+              <a:avLst/>
+            </a:prstTxWarp>
+            <a:noAutofit/>
+          </a:bodyPr>
+          <a:lstStyle/>
+          <a:p>
+            <a:pPr marL="0" marR="0" algn="ctr">
               <a:lnSpc>
                 <a:spcPct val="107000"/>
               </a:lnSpc>
               <a:spcBef>
-                <a:spcPts val="1200"/>
+                <a:spcPts val="0"/>
               </a:spcBef>
               <a:spcAft>
-                <a:spcPts val="600"/>
+                <a:spcPts val="800"/>
               </a:spcAft>
             </a:pPr>
             <a:r>
-              <a:rPr lang="en-US" dirty="0">
+              <a:rPr lang="en-US" sz="1200" dirty="0">
+                <a:solidFill>
+                  <a:srgbClr val="FFFF00"/>
+                </a:solidFill>
                 <a:effectLst/>
                 <a:latin typeface="Arial" panose="020B0604020202020204" pitchFamily="34" charset="0"/>
                 <a:ea typeface="Times New Roman" panose="02020603050405020304" pitchFamily="18" charset="0"/>
               </a:rPr>
-              <a:t>a) Click on the </a:t>
-            </a:r>
-            <a:r>
-              <a:rPr lang="en-US" b="1" dirty="0">
-                <a:effectLst/>
-                <a:latin typeface="Arial" panose="020B0604020202020204" pitchFamily="34" charset="0"/>
-                <a:ea typeface="Times New Roman" panose="02020603050405020304" pitchFamily="18" charset="0"/>
-              </a:rPr>
-              <a:t>Make and Program Device Main Project</a:t>
-            </a:r>
-            <a:r>
-              <a:rPr lang="en-US" dirty="0">
-                <a:effectLst/>
-                <a:latin typeface="Arial" panose="020B0604020202020204" pitchFamily="34" charset="0"/>
-                <a:ea typeface="Times New Roman" panose="02020603050405020304" pitchFamily="18" charset="0"/>
-              </a:rPr>
-              <a:t> icon in the MPLAB X main toolbar</a:t>
-            </a:r>
-          </a:p>
-          <a:p>
-            <a:endParaRPr lang="en-US" dirty="0"/>
-          </a:p>
-          <a:p>
-            <a:endParaRPr lang="en-US" dirty="0"/>
-          </a:p>
-          <a:p>
-            <a:endParaRPr lang="en-US" dirty="0"/>
-          </a:p>
-          <a:p>
-            <a:r>
-              <a:rPr lang="en-US" dirty="0">
-                <a:effectLst/>
-                <a:latin typeface="Arial" panose="020B0604020202020204" pitchFamily="34" charset="0"/>
-                <a:ea typeface="Times New Roman" panose="02020603050405020304" pitchFamily="18" charset="0"/>
-              </a:rPr>
-              <a:t>b) Verify that the programming phase was successful</a:t>
-            </a:r>
-          </a:p>
-          <a:p>
-            <a:endParaRPr lang="en-US" dirty="0"/>
-          </a:p>
-          <a:p>
-            <a:endParaRPr lang="en-US" dirty="0"/>
-          </a:p>
-          <a:p>
-            <a:endParaRPr lang="en-US" dirty="0"/>
-          </a:p>
-          <a:p>
-            <a:endParaRPr lang="en-US" dirty="0"/>
-          </a:p>
-          <a:p>
-            <a:endParaRPr lang="en-US" dirty="0"/>
-          </a:p>
+              <a:t>CLICK</a:t>
+            </a:r>
+            <a:endParaRPr lang="en-US" sz="1100" dirty="0">
+              <a:effectLst/>
+              <a:latin typeface="Arial" panose="020B0604020202020204" pitchFamily="34" charset="0"/>
+              <a:ea typeface="Times New Roman" panose="02020603050405020304" pitchFamily="18" charset="0"/>
+            </a:endParaRPr>
+          </a:p>
+        </p:txBody>
+      </p:sp>
+      <p:sp>
+        <p:nvSpPr>
+          <p:cNvPr id="9" name="TextBox 8">
+            <a:extLst>
+              <a:ext uri="{FF2B5EF4-FFF2-40B4-BE49-F238E27FC236}">
+                <a16:creationId xmlns:a16="http://schemas.microsoft.com/office/drawing/2014/main" id="{D51EFC18-96B6-5264-1468-46A0D2953C64}"/>
+              </a:ext>
+            </a:extLst>
+          </p:cNvPr>
+          <p:cNvSpPr txBox="1"/>
+          <p:nvPr/>
+        </p:nvSpPr>
+        <p:spPr>
+          <a:xfrm>
+            <a:off x="683448" y="5346279"/>
+            <a:ext cx="10825103" cy="367216"/>
+          </a:xfrm>
+          <a:prstGeom prst="rect">
+            <a:avLst/>
+          </a:prstGeom>
+          <a:noFill/>
+        </p:spPr>
+        <p:txBody>
+          <a:bodyPr wrap="square" rtlCol="0">
+            <a:spAutoFit/>
+          </a:bodyPr>
+          <a:lstStyle/>
           <a:p>
             <a:pPr marL="575945" marR="0" indent="-575945">
               <a:lnSpc>
@@ -5396,7 +5591,7 @@
                 <a:latin typeface="Arial" panose="020B0604020202020204" pitchFamily="34" charset="0"/>
                 <a:ea typeface="Times New Roman" panose="02020603050405020304" pitchFamily="18" charset="0"/>
               </a:rPr>
-              <a:t>STEP 5: </a:t>
+              <a:t>STEP 2: </a:t>
             </a:r>
             <a:r>
               <a:rPr lang="en-US" sz="1800" b="1" dirty="0">
@@ -5404,22 +5599,7 @@
                 <a:latin typeface="Arial" panose="020B0604020202020204" pitchFamily="34" charset="0"/>
                 <a:ea typeface="Times New Roman" panose="02020603050405020304" pitchFamily="18" charset="0"/>
               </a:rPr>
-              <a:t>Connect to the </a:t>
-            </a:r>
-            <a:r>
-              <a:rPr lang="en-US" b="1" dirty="0">
-                <a:latin typeface="Arial" panose="020B0604020202020204" pitchFamily="34" charset="0"/>
-                <a:ea typeface="Times New Roman" panose="02020603050405020304" pitchFamily="18" charset="0"/>
-              </a:rPr>
-              <a:t>WBZ451</a:t>
-            </a:r>
-            <a:r>
-              <a:rPr lang="en-US" sz="1800" b="1" dirty="0">
-                <a:effectLst/>
-                <a:latin typeface="Arial" panose="020B0604020202020204" pitchFamily="34" charset="0"/>
-                <a:ea typeface="Times New Roman" panose="02020603050405020304" pitchFamily="18" charset="0"/>
-              </a:rPr>
-              <a:t> Module Using the Microchip Bluetooth Data (MBD) Application</a:t>
+              <a:t>Debug Main Project</a:t>
             </a:r>
             <a:endParaRPr lang="en-US" sz="1800" dirty="0">
               <a:effectLst/>
@@ -5427,352 +5607,12 @@
               <a:ea typeface="Times New Roman" panose="02020603050405020304" pitchFamily="18" charset="0"/>
             </a:endParaRPr>
           </a:p>
-          <a:p>
-            <a:pPr marL="1033145" marR="0" indent="-575945">
-              <a:lnSpc>
-                <a:spcPct val="107000"/>
-              </a:lnSpc>
-              <a:spcBef>
-                <a:spcPts val="1200"/>
-              </a:spcBef>
-              <a:spcAft>
-                <a:spcPts val="600"/>
-              </a:spcAft>
-            </a:pPr>
-            <a:r>
-              <a:rPr lang="en-US" sz="1800" dirty="0">
-                <a:effectLst/>
-                <a:latin typeface="Arial" panose="020B0604020202020204" pitchFamily="34" charset="0"/>
-                <a:ea typeface="Times New Roman" panose="02020603050405020304" pitchFamily="18" charset="0"/>
-              </a:rPr>
-              <a:t>Follow the procedure in the section titled “Connecting CAN Network to Mobile App (MBD App)”</a:t>
-            </a:r>
-          </a:p>
-          <a:p>
-            <a:pPr marL="457200" marR="0">
-              <a:lnSpc>
-                <a:spcPct val="107000"/>
-              </a:lnSpc>
-              <a:spcBef>
-                <a:spcPts val="1200"/>
-              </a:spcBef>
-              <a:spcAft>
-                <a:spcPts val="600"/>
-              </a:spcAft>
-            </a:pPr>
-            <a:r>
-              <a:rPr lang="en-US" sz="1800" u="sng" dirty="0">
-                <a:solidFill>
-                  <a:srgbClr val="0000FF"/>
-                </a:solidFill>
-                <a:effectLst/>
-                <a:latin typeface="Arial" panose="020B0604020202020204" pitchFamily="34" charset="0"/>
-                <a:ea typeface="Times New Roman" panose="02020603050405020304" pitchFamily="18" charset="0"/>
-                <a:hlinkClick r:id="rId3"/>
-              </a:rPr>
-              <a:t>https://github.com/MicrochipTech/pic32cxbz2_wbz45x_ble_can_bridge/tree/main?tab=readme-ov-file#connecting-can-network-to-mobile-app-mbd-app</a:t>
-            </a:r>
-            <a:endParaRPr lang="en-US" sz="1800" u="sng" dirty="0">
-              <a:solidFill>
-                <a:srgbClr val="0000FF"/>
-              </a:solidFill>
-              <a:effectLst/>
-              <a:latin typeface="Arial" panose="020B0604020202020204" pitchFamily="34" charset="0"/>
-              <a:ea typeface="Times New Roman" panose="02020603050405020304" pitchFamily="18" charset="0"/>
-            </a:endParaRPr>
-          </a:p>
-        </p:txBody>
-      </p:sp>
-      <p:pic>
-        <p:nvPicPr>
-          <p:cNvPr id="12" name="Picture 11">
-            <a:extLst>
-              <a:ext uri="{FF2B5EF4-FFF2-40B4-BE49-F238E27FC236}">
-                <a16:creationId xmlns:a16="http://schemas.microsoft.com/office/drawing/2014/main" id="{D9E6BC65-EB56-D818-B151-9B574C0E044E}"/>
-              </a:ext>
-            </a:extLst>
-          </p:cNvPr>
-          <p:cNvPicPr>
-            <a:picLocks noChangeAspect="1"/>
-          </p:cNvPicPr>
-          <p:nvPr/>
-        </p:nvPicPr>
-        <p:blipFill>
-          <a:blip r:embed="rId4" cstate="print">
-            <a:extLst>
-              <a:ext uri="{28A0092B-C50C-407E-A947-70E740481C1C}">
-                <a14:useLocalDpi xmlns:a14="http://schemas.microsoft.com/office/drawing/2010/main" val="0"/>
-              </a:ext>
-            </a:extLst>
-          </a:blip>
-          <a:stretch>
-            <a:fillRect/>
-          </a:stretch>
-        </p:blipFill>
-        <p:spPr>
-          <a:xfrm>
-            <a:off x="921395" y="3069463"/>
-            <a:ext cx="6492240" cy="1240790"/>
-          </a:xfrm>
-          <a:prstGeom prst="rect">
-            <a:avLst/>
-          </a:prstGeom>
-        </p:spPr>
-      </p:pic>
-      <p:sp>
-        <p:nvSpPr>
-          <p:cNvPr id="13" name="Oval 12">
-            <a:extLst>
-              <a:ext uri="{FF2B5EF4-FFF2-40B4-BE49-F238E27FC236}">
-                <a16:creationId xmlns:a16="http://schemas.microsoft.com/office/drawing/2014/main" id="{21B42215-9A7F-E16D-440F-F484B967DA5E}"/>
-              </a:ext>
-            </a:extLst>
-          </p:cNvPr>
-          <p:cNvSpPr/>
-          <p:nvPr/>
-        </p:nvSpPr>
-        <p:spPr>
-          <a:xfrm>
-            <a:off x="909203" y="3938599"/>
-            <a:ext cx="1600200" cy="190500"/>
-          </a:xfrm>
-          <a:prstGeom prst="ellipse">
-            <a:avLst/>
-          </a:prstGeom>
-          <a:noFill/>
-          <a:ln>
-            <a:solidFill>
-              <a:srgbClr val="FF0000"/>
-            </a:solidFill>
-          </a:ln>
-        </p:spPr>
-        <p:style>
-          <a:lnRef idx="2">
-            <a:schemeClr val="accent1">
-              <a:shade val="50000"/>
-            </a:schemeClr>
-          </a:lnRef>
-          <a:fillRef idx="1">
-            <a:schemeClr val="accent1"/>
-          </a:fillRef>
-          <a:effectRef idx="0">
-            <a:schemeClr val="accent1"/>
-          </a:effectRef>
-          <a:fontRef idx="minor">
-            <a:schemeClr val="lt1"/>
-          </a:fontRef>
-        </p:style>
-        <p:txBody>
-          <a:bodyPr rot="0" spcFirstLastPara="0" vert="horz" wrap="square" lIns="91440" tIns="45720" rIns="91440" bIns="45720" numCol="1" spcCol="0" rtlCol="0" fromWordArt="0" anchor="ctr" anchorCtr="0" forceAA="0" compatLnSpc="1">
-            <a:prstTxWarp prst="textNoShape">
-              <a:avLst/>
-            </a:prstTxWarp>
-            <a:noAutofit/>
-          </a:bodyPr>
-          <a:lstStyle/>
-          <a:p>
-            <a:endParaRPr lang="en-US"/>
-          </a:p>
-        </p:txBody>
-      </p:sp>
-      <p:pic>
-        <p:nvPicPr>
-          <p:cNvPr id="14" name="Picture 13" descr="Graphical user interface, text, application, chat or text message&#10;&#10;Description automatically generated">
-            <a:extLst>
-              <a:ext uri="{FF2B5EF4-FFF2-40B4-BE49-F238E27FC236}">
-                <a16:creationId xmlns:a16="http://schemas.microsoft.com/office/drawing/2014/main" id="{E98177C4-8C57-02A0-A234-117E41937837}"/>
-              </a:ext>
-            </a:extLst>
-          </p:cNvPr>
-          <p:cNvPicPr>
-            <a:picLocks noChangeAspect="1"/>
-          </p:cNvPicPr>
-          <p:nvPr/>
-        </p:nvPicPr>
-        <p:blipFill>
-          <a:blip r:embed="rId5">
-            <a:extLst>
-              <a:ext uri="{28A0092B-C50C-407E-A947-70E740481C1C}">
-                <a14:useLocalDpi xmlns:a14="http://schemas.microsoft.com/office/drawing/2010/main" val="0"/>
-              </a:ext>
-            </a:extLst>
-          </a:blip>
-          <a:stretch>
-            <a:fillRect/>
-          </a:stretch>
-        </p:blipFill>
-        <p:spPr>
-          <a:xfrm>
-            <a:off x="6618986" y="1813433"/>
-            <a:ext cx="3416300" cy="1256030"/>
-          </a:xfrm>
-          <a:prstGeom prst="rect">
-            <a:avLst/>
-          </a:prstGeom>
-        </p:spPr>
-      </p:pic>
-      <p:sp>
-        <p:nvSpPr>
-          <p:cNvPr id="8" name="Right Arrow 7">
-            <a:extLst>
-              <a:ext uri="{FF2B5EF4-FFF2-40B4-BE49-F238E27FC236}">
-                <a16:creationId xmlns:a16="http://schemas.microsoft.com/office/drawing/2014/main" id="{7E5F9613-C9B4-A621-2173-3A49D330AB77}"/>
-              </a:ext>
-            </a:extLst>
-          </p:cNvPr>
-          <p:cNvSpPr/>
-          <p:nvPr/>
-        </p:nvSpPr>
-        <p:spPr>
-          <a:xfrm>
-            <a:off x="5899860" y="1792097"/>
-            <a:ext cx="838200" cy="558800"/>
-          </a:xfrm>
-          <a:prstGeom prst="rightArrow">
-            <a:avLst/>
-          </a:prstGeom>
-          <a:solidFill>
-            <a:srgbClr val="FF0000"/>
-          </a:solidFill>
-        </p:spPr>
-        <p:style>
-          <a:lnRef idx="2">
-            <a:schemeClr val="accent1">
-              <a:shade val="50000"/>
-            </a:schemeClr>
-          </a:lnRef>
-          <a:fillRef idx="1">
-            <a:schemeClr val="accent1"/>
-          </a:fillRef>
-          <a:effectRef idx="0">
-            <a:schemeClr val="accent1"/>
-          </a:effectRef>
-          <a:fontRef idx="minor">
-            <a:schemeClr val="lt1"/>
-          </a:fontRef>
-        </p:style>
-        <p:txBody>
-          <a:bodyPr rot="0" spcFirstLastPara="0" vert="horz" wrap="square" lIns="91440" tIns="45720" rIns="91440" bIns="45720" numCol="1" spcCol="0" rtlCol="0" fromWordArt="0" anchor="ctr" anchorCtr="0" forceAA="0" compatLnSpc="1">
-            <a:prstTxWarp prst="textNoShape">
-              <a:avLst/>
-            </a:prstTxWarp>
-            <a:noAutofit/>
-          </a:bodyPr>
-          <a:lstStyle/>
-          <a:p>
-            <a:pPr marL="0" marR="0" algn="ctr">
-              <a:lnSpc>
-                <a:spcPct val="107000"/>
-              </a:lnSpc>
-              <a:spcBef>
-                <a:spcPts val="0"/>
-              </a:spcBef>
-              <a:spcAft>
-                <a:spcPts val="800"/>
-              </a:spcAft>
-            </a:pPr>
-            <a:r>
-              <a:rPr lang="en-US" sz="1200" dirty="0">
-                <a:solidFill>
-                  <a:srgbClr val="FFFF00"/>
-                </a:solidFill>
-                <a:effectLst/>
-                <a:latin typeface="Arial" panose="020B0604020202020204" pitchFamily="34" charset="0"/>
-                <a:ea typeface="Times New Roman" panose="02020603050405020304" pitchFamily="18" charset="0"/>
-              </a:rPr>
-              <a:t>CLICK</a:t>
-            </a:r>
-            <a:endParaRPr lang="en-US" sz="1100" dirty="0">
-              <a:effectLst/>
-              <a:latin typeface="Arial" panose="020B0604020202020204" pitchFamily="34" charset="0"/>
-              <a:ea typeface="Times New Roman" panose="02020603050405020304" pitchFamily="18" charset="0"/>
-            </a:endParaRPr>
-          </a:p>
-        </p:txBody>
-      </p:sp>
-      <p:sp>
-        <p:nvSpPr>
-          <p:cNvPr id="15" name="Right Arrow 14">
-            <a:extLst>
-              <a:ext uri="{FF2B5EF4-FFF2-40B4-BE49-F238E27FC236}">
-                <a16:creationId xmlns:a16="http://schemas.microsoft.com/office/drawing/2014/main" id="{436FC1E8-E169-CE20-60DE-14759E49973B}"/>
-              </a:ext>
-            </a:extLst>
-          </p:cNvPr>
-          <p:cNvSpPr/>
-          <p:nvPr/>
-        </p:nvSpPr>
-        <p:spPr>
-          <a:xfrm>
-            <a:off x="201278" y="5497880"/>
-            <a:ext cx="838200" cy="558800"/>
-          </a:xfrm>
-          <a:prstGeom prst="rightArrow">
-            <a:avLst/>
-          </a:prstGeom>
-          <a:solidFill>
-            <a:srgbClr val="FF0000"/>
-          </a:solidFill>
-        </p:spPr>
-        <p:style>
-          <a:lnRef idx="2">
-            <a:schemeClr val="accent1">
-              <a:shade val="50000"/>
-            </a:schemeClr>
-          </a:lnRef>
-          <a:fillRef idx="1">
-            <a:schemeClr val="accent1"/>
-          </a:fillRef>
-          <a:effectRef idx="0">
-            <a:schemeClr val="accent1"/>
-          </a:effectRef>
-          <a:fontRef idx="minor">
-            <a:schemeClr val="lt1"/>
-          </a:fontRef>
-        </p:style>
-        <p:txBody>
-          <a:bodyPr rot="0" spcFirstLastPara="0" vert="horz" wrap="square" lIns="91440" tIns="45720" rIns="91440" bIns="45720" numCol="1" spcCol="0" rtlCol="0" fromWordArt="0" anchor="ctr" anchorCtr="0" forceAA="0" compatLnSpc="1">
-            <a:prstTxWarp prst="textNoShape">
-              <a:avLst/>
-            </a:prstTxWarp>
-            <a:noAutofit/>
-          </a:bodyPr>
-          <a:lstStyle/>
-          <a:p>
-            <a:pPr marL="0" marR="0" algn="ctr">
-              <a:lnSpc>
-                <a:spcPct val="107000"/>
-              </a:lnSpc>
-              <a:spcBef>
-                <a:spcPts val="0"/>
-              </a:spcBef>
-              <a:spcAft>
-                <a:spcPts val="800"/>
-              </a:spcAft>
-            </a:pPr>
-            <a:r>
-              <a:rPr lang="en-US" sz="1200" dirty="0">
-                <a:solidFill>
-                  <a:srgbClr val="FFFF00"/>
-                </a:solidFill>
-                <a:effectLst/>
-                <a:latin typeface="Arial" panose="020B0604020202020204" pitchFamily="34" charset="0"/>
-                <a:ea typeface="Times New Roman" panose="02020603050405020304" pitchFamily="18" charset="0"/>
-              </a:rPr>
-              <a:t>CLICK</a:t>
-            </a:r>
-            <a:endParaRPr lang="en-US" sz="1100" dirty="0">
-              <a:effectLst/>
-              <a:latin typeface="Arial" panose="020B0604020202020204" pitchFamily="34" charset="0"/>
-              <a:ea typeface="Times New Roman" panose="02020603050405020304" pitchFamily="18" charset="0"/>
-            </a:endParaRPr>
-          </a:p>
         </p:txBody>
       </p:sp>
     </p:spTree>
     <p:extLst>
       <p:ext uri="{BB962C8B-B14F-4D97-AF65-F5344CB8AC3E}">
-        <p14:creationId xmlns:p14="http://schemas.microsoft.com/office/powerpoint/2010/main" val="43339631"/>
+        <p14:creationId xmlns:p14="http://schemas.microsoft.com/office/powerpoint/2010/main" val="161281222"/>
       </p:ext>
     </p:extLst>
   </p:cSld>
@@ -11831,347 +11671,81 @@
           <a:chExt cx="0" cy="0"/>
         </a:xfrm>
       </p:grpSpPr>
+      <p:sp>
+        <p:nvSpPr>
+          <p:cNvPr id="2" name="TextBox 1">
+            <a:extLst>
+              <a:ext uri="{FF2B5EF4-FFF2-40B4-BE49-F238E27FC236}">
+                <a16:creationId xmlns:a16="http://schemas.microsoft.com/office/drawing/2014/main" id="{EF6874F3-7045-70A8-1F64-660B9B5BFFB9}"/>
+              </a:ext>
+            </a:extLst>
+          </p:cNvPr>
+          <p:cNvSpPr txBox="1"/>
+          <p:nvPr/>
+        </p:nvSpPr>
+        <p:spPr>
+          <a:xfrm>
+            <a:off x="1636949" y="184848"/>
+            <a:ext cx="9495087" cy="584775"/>
+          </a:xfrm>
+          <a:prstGeom prst="rect">
+            <a:avLst/>
+          </a:prstGeom>
+          <a:noFill/>
+        </p:spPr>
+        <p:txBody>
+          <a:bodyPr wrap="square" rtlCol="0">
+            <a:spAutoFit/>
+          </a:bodyPr>
+          <a:lstStyle/>
+          <a:p>
+            <a:pPr algn="ctr"/>
+            <a:r>
+              <a:rPr lang="en-US" sz="3200" b="1" dirty="0">
+                <a:latin typeface="Arial" panose="020B0604020202020204" pitchFamily="34" charset="0"/>
+                <a:cs typeface="Arial" panose="020B0604020202020204" pitchFamily="34" charset="0"/>
+              </a:rPr>
+              <a:t>Module Pin Assignment</a:t>
+            </a:r>
+          </a:p>
+        </p:txBody>
+      </p:sp>
       <p:pic>
         <p:nvPicPr>
-          <p:cNvPr id="2050" name="Picture 2" descr="Large, zoomable image of Microchip Technology EV96B94A Development Boards. 1 of 5">
-            <a:extLst>
-              <a:ext uri="{FF2B5EF4-FFF2-40B4-BE49-F238E27FC236}">
-                <a16:creationId xmlns:a16="http://schemas.microsoft.com/office/drawing/2014/main" id="{1FD04C83-D029-335D-E999-4C639CF7D128}"/>
+          <p:cNvPr id="3" name="Picture 2" descr="A black text on a white background&#10;&#10;Description automatically generated">
+            <a:extLst>
+              <a:ext uri="{FF2B5EF4-FFF2-40B4-BE49-F238E27FC236}">
+                <a16:creationId xmlns:a16="http://schemas.microsoft.com/office/drawing/2014/main" id="{F9CEA8E3-DBFA-F42F-8690-7924C2016DAE}"/>
               </a:ext>
             </a:extLst>
           </p:cNvPr>
           <p:cNvPicPr>
-            <a:picLocks noChangeAspect="1" noChangeArrowheads="1"/>
+            <a:picLocks noChangeAspect="1"/>
           </p:cNvPicPr>
           <p:nvPr/>
         </p:nvPicPr>
         <p:blipFill>
-          <a:blip r:embed="rId2">
-            <a:extLst>
-              <a:ext uri="{28A0092B-C50C-407E-A947-70E740481C1C}">
-                <a14:useLocalDpi xmlns:a14="http://schemas.microsoft.com/office/drawing/2010/main" val="0"/>
-              </a:ext>
-            </a:extLst>
-          </a:blip>
-          <a:srcRect/>
+          <a:blip r:embed="rId2"/>
           <a:stretch>
             <a:fillRect/>
           </a:stretch>
         </p:blipFill>
-        <p:spPr bwMode="auto">
-          <a:xfrm rot="5400000">
-            <a:off x="-999081" y="2377302"/>
-            <a:ext cx="5873727" cy="2956574"/>
+        <p:spPr>
+          <a:xfrm>
+            <a:off x="9574022" y="6138164"/>
+            <a:ext cx="2578100" cy="698500"/>
           </a:xfrm>
           <a:prstGeom prst="rect">
             <a:avLst/>
           </a:prstGeom>
-          <a:noFill/>
-          <a:extLst>
-            <a:ext uri="{909E8E84-426E-40DD-AFC4-6F175D3DCCD1}">
-              <a14:hiddenFill xmlns:a14="http://schemas.microsoft.com/office/drawing/2010/main">
-                <a:solidFill>
-                  <a:srgbClr val="FFFFFF"/>
-                </a:solidFill>
-              </a14:hiddenFill>
-            </a:ext>
-          </a:extLst>
         </p:spPr>
       </p:pic>
-      <p:sp>
-        <p:nvSpPr>
-          <p:cNvPr id="3" name="TextBox 2">
-            <a:extLst>
-              <a:ext uri="{FF2B5EF4-FFF2-40B4-BE49-F238E27FC236}">
-                <a16:creationId xmlns:a16="http://schemas.microsoft.com/office/drawing/2014/main" id="{AA98A3E9-DEE6-4656-DB43-707C7EF994A2}"/>
-              </a:ext>
-            </a:extLst>
-          </p:cNvPr>
-          <p:cNvSpPr txBox="1"/>
-          <p:nvPr/>
-        </p:nvSpPr>
-        <p:spPr>
-          <a:xfrm>
-            <a:off x="1469241" y="65546"/>
-            <a:ext cx="9902953" cy="584775"/>
-          </a:xfrm>
-          <a:prstGeom prst="rect">
-            <a:avLst/>
-          </a:prstGeom>
-          <a:noFill/>
-        </p:spPr>
-        <p:txBody>
-          <a:bodyPr wrap="square" rtlCol="0">
-            <a:spAutoFit/>
-          </a:bodyPr>
-          <a:lstStyle/>
-          <a:p>
-            <a:pPr algn="ctr"/>
-            <a:r>
-              <a:rPr lang="en-US" sz="3200" b="1" dirty="0">
-                <a:latin typeface="Arial" panose="020B0604020202020204" pitchFamily="34" charset="0"/>
-                <a:cs typeface="Arial" panose="020B0604020202020204" pitchFamily="34" charset="0"/>
-              </a:rPr>
-              <a:t>WBZ451 Curiosity Development Board : RGB LED</a:t>
-            </a:r>
-          </a:p>
-        </p:txBody>
-      </p:sp>
-      <p:sp>
-        <p:nvSpPr>
-          <p:cNvPr id="2" name="Oval 1">
-            <a:extLst>
-              <a:ext uri="{FF2B5EF4-FFF2-40B4-BE49-F238E27FC236}">
-                <a16:creationId xmlns:a16="http://schemas.microsoft.com/office/drawing/2014/main" id="{2522E36E-9BCC-6E33-8E26-99F15B457055}"/>
-              </a:ext>
-            </a:extLst>
-          </p:cNvPr>
-          <p:cNvSpPr/>
-          <p:nvPr/>
-        </p:nvSpPr>
-        <p:spPr>
-          <a:xfrm>
-            <a:off x="2351658" y="2688639"/>
-            <a:ext cx="630621" cy="633248"/>
-          </a:xfrm>
-          <a:prstGeom prst="ellipse">
-            <a:avLst/>
-          </a:prstGeom>
-          <a:noFill/>
-          <a:ln w="31750">
-            <a:solidFill>
-              <a:srgbClr val="FFFF00"/>
-            </a:solidFill>
-          </a:ln>
-        </p:spPr>
-        <p:style>
-          <a:lnRef idx="2">
-            <a:schemeClr val="accent1">
-              <a:shade val="15000"/>
-            </a:schemeClr>
-          </a:lnRef>
-          <a:fillRef idx="1">
-            <a:schemeClr val="accent1"/>
-          </a:fillRef>
-          <a:effectRef idx="0">
-            <a:schemeClr val="accent1"/>
-          </a:effectRef>
-          <a:fontRef idx="minor">
-            <a:schemeClr val="lt1"/>
-          </a:fontRef>
-        </p:style>
-        <p:txBody>
-          <a:bodyPr rtlCol="0" anchor="ctr"/>
-          <a:lstStyle/>
-          <a:p>
-            <a:pPr algn="ctr"/>
-            <a:endParaRPr lang="en-US"/>
-          </a:p>
-        </p:txBody>
-      </p:sp>
-      <p:sp>
-        <p:nvSpPr>
-          <p:cNvPr id="4" name="Left Arrow 3">
-            <a:extLst>
-              <a:ext uri="{FF2B5EF4-FFF2-40B4-BE49-F238E27FC236}">
-                <a16:creationId xmlns:a16="http://schemas.microsoft.com/office/drawing/2014/main" id="{CEE6EEE0-E5FD-02D1-C342-8CDDAF21CD61}"/>
-              </a:ext>
-            </a:extLst>
-          </p:cNvPr>
-          <p:cNvSpPr/>
-          <p:nvPr/>
-        </p:nvSpPr>
-        <p:spPr>
-          <a:xfrm>
-            <a:off x="2996134" y="2688639"/>
-            <a:ext cx="1457116" cy="633248"/>
-          </a:xfrm>
-          <a:prstGeom prst="leftArrow">
-            <a:avLst/>
-          </a:prstGeom>
-        </p:spPr>
-        <p:style>
-          <a:lnRef idx="2">
-            <a:schemeClr val="accent1">
-              <a:shade val="15000"/>
-            </a:schemeClr>
-          </a:lnRef>
-          <a:fillRef idx="1">
-            <a:schemeClr val="accent1"/>
-          </a:fillRef>
-          <a:effectRef idx="0">
-            <a:schemeClr val="accent1"/>
-          </a:effectRef>
-          <a:fontRef idx="minor">
-            <a:schemeClr val="lt1"/>
-          </a:fontRef>
-        </p:style>
-        <p:txBody>
-          <a:bodyPr rtlCol="0" anchor="ctr"/>
-          <a:lstStyle/>
-          <a:p>
-            <a:pPr algn="ctr"/>
-            <a:r>
-              <a:rPr lang="en-US" dirty="0"/>
-              <a:t>RGB LED</a:t>
-            </a:r>
-          </a:p>
-        </p:txBody>
-      </p:sp>
       <p:pic>
         <p:nvPicPr>
-          <p:cNvPr id="33" name="Picture 2" descr="Large, zoomable image of Microchip Technology EV96B94A Development Boards. 1 of 5">
-            <a:extLst>
-              <a:ext uri="{FF2B5EF4-FFF2-40B4-BE49-F238E27FC236}">
-                <a16:creationId xmlns:a16="http://schemas.microsoft.com/office/drawing/2014/main" id="{563CCAAD-44A7-2418-A422-4DC3EAAD0301}"/>
-              </a:ext>
-            </a:extLst>
-          </p:cNvPr>
-          <p:cNvPicPr>
-            <a:picLocks noChangeAspect="1" noChangeArrowheads="1"/>
-          </p:cNvPicPr>
-          <p:nvPr/>
-        </p:nvPicPr>
-        <p:blipFill>
-          <a:blip r:embed="rId2">
-            <a:extLst>
-              <a:ext uri="{28A0092B-C50C-407E-A947-70E740481C1C}">
-                <a14:useLocalDpi xmlns:a14="http://schemas.microsoft.com/office/drawing/2010/main" val="0"/>
-              </a:ext>
-            </a:extLst>
-          </a:blip>
-          <a:srcRect/>
-          <a:stretch>
-            <a:fillRect/>
-          </a:stretch>
-        </p:blipFill>
-        <p:spPr bwMode="auto">
-          <a:xfrm rot="5400000">
-            <a:off x="4801886" y="2377303"/>
-            <a:ext cx="5873727" cy="2956574"/>
-          </a:xfrm>
-          <a:prstGeom prst="rect">
-            <a:avLst/>
-          </a:prstGeom>
-          <a:noFill/>
-          <a:extLst>
-            <a:ext uri="{909E8E84-426E-40DD-AFC4-6F175D3DCCD1}">
-              <a14:hiddenFill xmlns:a14="http://schemas.microsoft.com/office/drawing/2010/main">
-                <a:solidFill>
-                  <a:srgbClr val="FFFFFF"/>
-                </a:solidFill>
-              </a14:hiddenFill>
-            </a:ext>
-          </a:extLst>
-        </p:spPr>
-      </p:pic>
-      <p:sp>
-        <p:nvSpPr>
-          <p:cNvPr id="35" name="Oval 34">
-            <a:extLst>
-              <a:ext uri="{FF2B5EF4-FFF2-40B4-BE49-F238E27FC236}">
-                <a16:creationId xmlns:a16="http://schemas.microsoft.com/office/drawing/2014/main" id="{F773AAAE-11AD-2C16-4532-EAFEF0D46739}"/>
-              </a:ext>
-            </a:extLst>
-          </p:cNvPr>
-          <p:cNvSpPr/>
-          <p:nvPr/>
-        </p:nvSpPr>
-        <p:spPr>
-          <a:xfrm>
-            <a:off x="8152625" y="2688640"/>
-            <a:ext cx="630621" cy="633248"/>
-          </a:xfrm>
-          <a:prstGeom prst="ellipse">
-            <a:avLst/>
-          </a:prstGeom>
-          <a:noFill/>
-          <a:ln w="31750">
-            <a:solidFill>
-              <a:srgbClr val="FFFF00"/>
-            </a:solidFill>
-          </a:ln>
-        </p:spPr>
-        <p:style>
-          <a:lnRef idx="2">
-            <a:schemeClr val="accent1">
-              <a:shade val="15000"/>
-            </a:schemeClr>
-          </a:lnRef>
-          <a:fillRef idx="1">
-            <a:schemeClr val="accent1"/>
-          </a:fillRef>
-          <a:effectRef idx="0">
-            <a:schemeClr val="accent1"/>
-          </a:effectRef>
-          <a:fontRef idx="minor">
-            <a:schemeClr val="lt1"/>
-          </a:fontRef>
-        </p:style>
-        <p:txBody>
-          <a:bodyPr rtlCol="0" anchor="ctr"/>
-          <a:lstStyle/>
-          <a:p>
-            <a:pPr algn="ctr"/>
-            <a:endParaRPr lang="en-US"/>
-          </a:p>
-        </p:txBody>
-      </p:sp>
-      <p:sp>
-        <p:nvSpPr>
-          <p:cNvPr id="37" name="Left Arrow 36">
-            <a:extLst>
-              <a:ext uri="{FF2B5EF4-FFF2-40B4-BE49-F238E27FC236}">
-                <a16:creationId xmlns:a16="http://schemas.microsoft.com/office/drawing/2014/main" id="{BCF47100-0DCF-C0AD-8131-7F485D5224D7}"/>
-              </a:ext>
-            </a:extLst>
-          </p:cNvPr>
-          <p:cNvSpPr/>
-          <p:nvPr/>
-        </p:nvSpPr>
-        <p:spPr>
-          <a:xfrm>
-            <a:off x="8797101" y="2688640"/>
-            <a:ext cx="1457116" cy="633248"/>
-          </a:xfrm>
-          <a:prstGeom prst="leftArrow">
-            <a:avLst/>
-          </a:prstGeom>
-        </p:spPr>
-        <p:style>
-          <a:lnRef idx="2">
-            <a:schemeClr val="accent1">
-              <a:shade val="15000"/>
-            </a:schemeClr>
-          </a:lnRef>
-          <a:fillRef idx="1">
-            <a:schemeClr val="accent1"/>
-          </a:fillRef>
-          <a:effectRef idx="0">
-            <a:schemeClr val="accent1"/>
-          </a:effectRef>
-          <a:fontRef idx="minor">
-            <a:schemeClr val="lt1"/>
-          </a:fontRef>
-        </p:style>
-        <p:txBody>
-          <a:bodyPr rtlCol="0" anchor="ctr"/>
-          <a:lstStyle/>
-          <a:p>
-            <a:pPr algn="ctr"/>
-            <a:r>
-              <a:rPr lang="en-US" dirty="0"/>
-              <a:t>RGB LED</a:t>
-            </a:r>
-          </a:p>
-        </p:txBody>
-      </p:sp>
-      <p:pic>
-        <p:nvPicPr>
-          <p:cNvPr id="39" name="Picture 38" descr="A black text on a white background&#10;&#10;Description automatically generated">
-            <a:extLst>
-              <a:ext uri="{FF2B5EF4-FFF2-40B4-BE49-F238E27FC236}">
-                <a16:creationId xmlns:a16="http://schemas.microsoft.com/office/drawing/2014/main" id="{DE5A97EA-A4AD-BCBF-5005-CA3443F08E74}"/>
+          <p:cNvPr id="8" name="Picture 7" descr="A computer screen shot of a computer&#10;&#10;Description automatically generated">
+            <a:extLst>
+              <a:ext uri="{FF2B5EF4-FFF2-40B4-BE49-F238E27FC236}">
+                <a16:creationId xmlns:a16="http://schemas.microsoft.com/office/drawing/2014/main" id="{9B03CCDA-6ED7-98BD-6283-3B9C3D9163CA}"/>
               </a:ext>
             </a:extLst>
           </p:cNvPr>
@@ -12188,228 +11762,18 @@
         </p:blipFill>
         <p:spPr>
           <a:xfrm>
-            <a:off x="9574022" y="6138164"/>
-            <a:ext cx="2578100" cy="698500"/>
+            <a:off x="1298247" y="769623"/>
+            <a:ext cx="8099346" cy="5785247"/>
           </a:xfrm>
           <a:prstGeom prst="rect">
             <a:avLst/>
           </a:prstGeom>
         </p:spPr>
       </p:pic>
-      <p:sp>
-        <p:nvSpPr>
-          <p:cNvPr id="40" name="Oval 39">
-            <a:extLst>
-              <a:ext uri="{FF2B5EF4-FFF2-40B4-BE49-F238E27FC236}">
-                <a16:creationId xmlns:a16="http://schemas.microsoft.com/office/drawing/2014/main" id="{AF88DF78-F9FC-8990-5A77-08340232611A}"/>
-              </a:ext>
-            </a:extLst>
-          </p:cNvPr>
-          <p:cNvSpPr/>
-          <p:nvPr/>
-        </p:nvSpPr>
-        <p:spPr>
-          <a:xfrm>
-            <a:off x="2559844" y="2881958"/>
-            <a:ext cx="228600" cy="228600"/>
-          </a:xfrm>
-          <a:prstGeom prst="ellipse">
-            <a:avLst/>
-          </a:prstGeom>
-          <a:solidFill>
-            <a:schemeClr val="accent1">
-              <a:lumMod val="60000"/>
-              <a:lumOff val="40000"/>
-            </a:schemeClr>
-          </a:solidFill>
-          <a:ln w="31750">
-            <a:noFill/>
-          </a:ln>
-        </p:spPr>
-        <p:style>
-          <a:lnRef idx="2">
-            <a:schemeClr val="accent1">
-              <a:shade val="15000"/>
-            </a:schemeClr>
-          </a:lnRef>
-          <a:fillRef idx="1">
-            <a:schemeClr val="accent1"/>
-          </a:fillRef>
-          <a:effectRef idx="0">
-            <a:schemeClr val="accent1"/>
-          </a:effectRef>
-          <a:fontRef idx="minor">
-            <a:schemeClr val="lt1"/>
-          </a:fontRef>
-        </p:style>
-        <p:txBody>
-          <a:bodyPr rtlCol="0" anchor="ctr"/>
-          <a:lstStyle/>
-          <a:p>
-            <a:pPr algn="ctr"/>
-            <a:endParaRPr lang="en-US"/>
-          </a:p>
-        </p:txBody>
-      </p:sp>
-      <p:sp>
-        <p:nvSpPr>
-          <p:cNvPr id="42" name="Oval 41">
-            <a:extLst>
-              <a:ext uri="{FF2B5EF4-FFF2-40B4-BE49-F238E27FC236}">
-                <a16:creationId xmlns:a16="http://schemas.microsoft.com/office/drawing/2014/main" id="{4F0040D8-201F-80C6-CF86-33B5CC5D2801}"/>
-              </a:ext>
-            </a:extLst>
-          </p:cNvPr>
-          <p:cNvSpPr/>
-          <p:nvPr/>
-        </p:nvSpPr>
-        <p:spPr>
-          <a:xfrm>
-            <a:off x="8367490" y="2904819"/>
-            <a:ext cx="228600" cy="228600"/>
-          </a:xfrm>
-          <a:prstGeom prst="ellipse">
-            <a:avLst/>
-          </a:prstGeom>
-          <a:solidFill>
-            <a:schemeClr val="accent3">
-              <a:lumMod val="60000"/>
-              <a:lumOff val="40000"/>
-            </a:schemeClr>
-          </a:solidFill>
-          <a:ln w="31750">
-            <a:noFill/>
-          </a:ln>
-        </p:spPr>
-        <p:style>
-          <a:lnRef idx="2">
-            <a:schemeClr val="accent1">
-              <a:shade val="15000"/>
-            </a:schemeClr>
-          </a:lnRef>
-          <a:fillRef idx="1">
-            <a:schemeClr val="accent1"/>
-          </a:fillRef>
-          <a:effectRef idx="0">
-            <a:schemeClr val="accent1"/>
-          </a:effectRef>
-          <a:fontRef idx="minor">
-            <a:schemeClr val="lt1"/>
-          </a:fontRef>
-        </p:style>
-        <p:txBody>
-          <a:bodyPr rtlCol="0" anchor="ctr"/>
-          <a:lstStyle/>
-          <a:p>
-            <a:pPr algn="ctr"/>
-            <a:endParaRPr lang="en-US"/>
-          </a:p>
-        </p:txBody>
-      </p:sp>
-      <p:sp>
-        <p:nvSpPr>
-          <p:cNvPr id="5" name="TextBox 4">
-            <a:extLst>
-              <a:ext uri="{FF2B5EF4-FFF2-40B4-BE49-F238E27FC236}">
-                <a16:creationId xmlns:a16="http://schemas.microsoft.com/office/drawing/2014/main" id="{151635D9-424C-5421-F33D-9FF2A109D91B}"/>
-              </a:ext>
-            </a:extLst>
-          </p:cNvPr>
-          <p:cNvSpPr txBox="1"/>
-          <p:nvPr/>
-        </p:nvSpPr>
-        <p:spPr>
-          <a:xfrm>
-            <a:off x="4538859" y="2688639"/>
-            <a:ext cx="1692245" cy="1477328"/>
-          </a:xfrm>
-          <a:prstGeom prst="rect">
-            <a:avLst/>
-          </a:prstGeom>
-          <a:noFill/>
-        </p:spPr>
-        <p:txBody>
-          <a:bodyPr wrap="square" rtlCol="0">
-            <a:spAutoFit/>
-          </a:bodyPr>
-          <a:lstStyle/>
-          <a:p>
-            <a:r>
-              <a:rPr lang="en-US" dirty="0"/>
-              <a:t>Pulses </a:t>
-            </a:r>
-            <a:r>
-              <a:rPr lang="en-US" b="1" dirty="0">
-                <a:solidFill>
-                  <a:schemeClr val="accent1">
-                    <a:lumMod val="60000"/>
-                    <a:lumOff val="40000"/>
-                  </a:schemeClr>
-                </a:solidFill>
-              </a:rPr>
-              <a:t>blue</a:t>
-            </a:r>
-            <a:r>
-              <a:rPr lang="en-US" dirty="0"/>
-              <a:t> whenever CAN message is received from CAN controller</a:t>
-            </a:r>
-          </a:p>
-        </p:txBody>
-      </p:sp>
-      <p:sp>
-        <p:nvSpPr>
-          <p:cNvPr id="6" name="TextBox 5">
-            <a:extLst>
-              <a:ext uri="{FF2B5EF4-FFF2-40B4-BE49-F238E27FC236}">
-                <a16:creationId xmlns:a16="http://schemas.microsoft.com/office/drawing/2014/main" id="{C66F3AEE-8BC2-7180-E308-841D6FAFA542}"/>
-              </a:ext>
-            </a:extLst>
-          </p:cNvPr>
-          <p:cNvSpPr txBox="1"/>
-          <p:nvPr/>
-        </p:nvSpPr>
-        <p:spPr>
-          <a:xfrm>
-            <a:off x="10283575" y="2732850"/>
-            <a:ext cx="1635156" cy="1200329"/>
-          </a:xfrm>
-          <a:prstGeom prst="rect">
-            <a:avLst/>
-          </a:prstGeom>
-          <a:noFill/>
-        </p:spPr>
-        <p:txBody>
-          <a:bodyPr wrap="square" rtlCol="0">
-            <a:spAutoFit/>
-          </a:bodyPr>
-          <a:lstStyle/>
-          <a:p>
-            <a:r>
-              <a:rPr lang="en-US" dirty="0"/>
-              <a:t>Pulses </a:t>
-            </a:r>
-            <a:r>
-              <a:rPr lang="en-US" b="1" dirty="0">
-                <a:solidFill>
-                  <a:schemeClr val="accent3">
-                    <a:lumMod val="60000"/>
-                    <a:lumOff val="40000"/>
-                  </a:schemeClr>
-                </a:solidFill>
-              </a:rPr>
-              <a:t>green</a:t>
-            </a:r>
-            <a:r>
-              <a:rPr lang="en-US" dirty="0"/>
-              <a:t> whenever BLE message sent or received</a:t>
-            </a:r>
-          </a:p>
-        </p:txBody>
-      </p:sp>
     </p:spTree>
     <p:extLst>
       <p:ext uri="{BB962C8B-B14F-4D97-AF65-F5344CB8AC3E}">
-        <p14:creationId xmlns:p14="http://schemas.microsoft.com/office/powerpoint/2010/main" val="2200989756"/>
+        <p14:creationId xmlns:p14="http://schemas.microsoft.com/office/powerpoint/2010/main" val="843843061"/>
       </p:ext>
     </p:extLst>
   </p:cSld>
@@ -12470,8 +11834,109 @@
                 <a:latin typeface="Arial" panose="020B0604020202020204" pitchFamily="34" charset="0"/>
                 <a:cs typeface="Arial" panose="020B0604020202020204" pitchFamily="34" charset="0"/>
               </a:rPr>
-              <a:t>Module Pin Assignment</a:t>
-            </a:r>
+              <a:t>Software Development Tools</a:t>
+            </a:r>
+          </a:p>
+        </p:txBody>
+      </p:sp>
+      <p:sp>
+        <p:nvSpPr>
+          <p:cNvPr id="4" name="TextBox 3">
+            <a:extLst>
+              <a:ext uri="{FF2B5EF4-FFF2-40B4-BE49-F238E27FC236}">
+                <a16:creationId xmlns:a16="http://schemas.microsoft.com/office/drawing/2014/main" id="{59283A62-0A20-08C9-E3ED-FBC140B2DD10}"/>
+              </a:ext>
+            </a:extLst>
+          </p:cNvPr>
+          <p:cNvSpPr txBox="1"/>
+          <p:nvPr/>
+        </p:nvSpPr>
+        <p:spPr>
+          <a:xfrm>
+            <a:off x="914400" y="1319134"/>
+            <a:ext cx="9983449" cy="4462760"/>
+          </a:xfrm>
+          <a:prstGeom prst="rect">
+            <a:avLst/>
+          </a:prstGeom>
+          <a:noFill/>
+        </p:spPr>
+        <p:txBody>
+          <a:bodyPr wrap="square" rtlCol="0">
+            <a:spAutoFit/>
+          </a:bodyPr>
+          <a:lstStyle/>
+          <a:p>
+            <a:r>
+              <a:rPr lang="en-US" sz="2400" dirty="0"/>
+              <a:t>1. MPLAB X IDE</a:t>
+            </a:r>
+          </a:p>
+          <a:p>
+            <a:endParaRPr lang="en-US" dirty="0">
+              <a:hlinkClick r:id="rId2"/>
+            </a:endParaRPr>
+          </a:p>
+          <a:p>
+            <a:r>
+              <a:rPr lang="en-US" sz="2000" dirty="0">
+                <a:hlinkClick r:id="rId2"/>
+              </a:rPr>
+              <a:t>https://www.microchip.com/en-us/tools-resources/develop/mplab-x-ide#tabs</a:t>
+            </a:r>
+            <a:endParaRPr lang="en-US" sz="2000" dirty="0"/>
+          </a:p>
+          <a:p>
+            <a:endParaRPr lang="en-US" dirty="0"/>
+          </a:p>
+          <a:p>
+            <a:r>
+              <a:rPr lang="en-US" sz="2400" dirty="0"/>
+              <a:t>2. XC32 Compiler</a:t>
+            </a:r>
+          </a:p>
+          <a:p>
+            <a:endParaRPr lang="en-US" dirty="0">
+              <a:hlinkClick r:id="rId3"/>
+            </a:endParaRPr>
+          </a:p>
+          <a:p>
+            <a:r>
+              <a:rPr lang="en-US" sz="2000" dirty="0">
+                <a:hlinkClick r:id="rId3"/>
+              </a:rPr>
+              <a:t>https://www.microchip.com/en-us/tools-resources/develop/mplab-xc-compilers/xc32</a:t>
+            </a:r>
+            <a:endParaRPr lang="en-US" sz="2000" dirty="0"/>
+          </a:p>
+          <a:p>
+            <a:endParaRPr lang="en-US" sz="2000" dirty="0"/>
+          </a:p>
+          <a:p>
+            <a:r>
+              <a:rPr lang="en-US" sz="2400" dirty="0"/>
+              <a:t>3. Microchip Bluetooth Data (MBD) Smartphone App</a:t>
+            </a:r>
+          </a:p>
+          <a:p>
+            <a:endParaRPr lang="en-US" sz="2000" dirty="0">
+              <a:hlinkClick r:id="rId3"/>
+            </a:endParaRPr>
+          </a:p>
+          <a:p>
+            <a:r>
+              <a:rPr lang="en-US" sz="2000" dirty="0">
+                <a:hlinkClick r:id="rId4"/>
+              </a:rPr>
+              <a:t>https://play.google.com/store/apps/details?id=com.microchip.bluetooth.data&amp;hl=en_US&amp;pli=1</a:t>
+            </a:r>
+            <a:endParaRPr lang="en-US" sz="2000" dirty="0"/>
+          </a:p>
+          <a:p>
+            <a:endParaRPr lang="en-US" sz="2000" dirty="0"/>
+          </a:p>
+          <a:p>
+            <a:endParaRPr lang="en-US" dirty="0"/>
           </a:p>
         </p:txBody>
       </p:sp>
@@ -12490,7 +11955,7 @@
           <p:nvPr/>
         </p:nvPicPr>
         <p:blipFill>
-          <a:blip r:embed="rId2"/>
+          <a:blip r:embed="rId5"/>
           <a:stretch>
             <a:fillRect/>
           </a:stretch>
@@ -12505,40 +11970,10 @@
           </a:prstGeom>
         </p:spPr>
       </p:pic>
-      <p:pic>
-        <p:nvPicPr>
-          <p:cNvPr id="8" name="Picture 7" descr="A computer screen shot of a computer&#10;&#10;Description automatically generated">
-            <a:extLst>
-              <a:ext uri="{FF2B5EF4-FFF2-40B4-BE49-F238E27FC236}">
-                <a16:creationId xmlns:a16="http://schemas.microsoft.com/office/drawing/2014/main" id="{9B03CCDA-6ED7-98BD-6283-3B9C3D9163CA}"/>
-              </a:ext>
-            </a:extLst>
-          </p:cNvPr>
-          <p:cNvPicPr>
-            <a:picLocks noChangeAspect="1"/>
-          </p:cNvPicPr>
-          <p:nvPr/>
-        </p:nvPicPr>
-        <p:blipFill>
-          <a:blip r:embed="rId3"/>
-          <a:stretch>
-            <a:fillRect/>
-          </a:stretch>
-        </p:blipFill>
-        <p:spPr>
-          <a:xfrm>
-            <a:off x="1298247" y="769623"/>
-            <a:ext cx="8099346" cy="5785247"/>
-          </a:xfrm>
-          <a:prstGeom prst="rect">
-            <a:avLst/>
-          </a:prstGeom>
-        </p:spPr>
-      </p:pic>
     </p:spTree>
     <p:extLst>
       <p:ext uri="{BB962C8B-B14F-4D97-AF65-F5344CB8AC3E}">
-        <p14:creationId xmlns:p14="http://schemas.microsoft.com/office/powerpoint/2010/main" val="843843061"/>
+        <p14:creationId xmlns:p14="http://schemas.microsoft.com/office/powerpoint/2010/main" val="535867481"/>
       </p:ext>
     </p:extLst>
   </p:cSld>
@@ -12599,7 +12034,7 @@
                 <a:latin typeface="Arial" panose="020B0604020202020204" pitchFamily="34" charset="0"/>
                 <a:cs typeface="Arial" panose="020B0604020202020204" pitchFamily="34" charset="0"/>
               </a:rPr>
-              <a:t>Software Development Tools</a:t>
+              <a:t>Demo Procedure</a:t>
             </a:r>
           </a:p>
         </p:txBody>
@@ -12618,8 +12053,8 @@
         </p:nvSpPr>
         <p:spPr>
           <a:xfrm>
-            <a:off x="914400" y="1319134"/>
-            <a:ext cx="9983449" cy="4462760"/>
+            <a:off x="567827" y="1058607"/>
+            <a:ext cx="10972532" cy="5235087"/>
           </a:xfrm>
           <a:prstGeom prst="rect">
             <a:avLst/>
@@ -12632,70 +12067,359 @@
           </a:bodyPr>
           <a:lstStyle/>
           <a:p>
-            <a:r>
-              <a:rPr lang="en-US" sz="2400" dirty="0"/>
-              <a:t>1. MPLAB X IDE</a:t>
-            </a:r>
-          </a:p>
-          <a:p>
-            <a:endParaRPr lang="en-US" dirty="0">
-              <a:hlinkClick r:id="rId2"/>
+            <a:pPr marL="457200" marR="0" indent="-457200">
+              <a:lnSpc>
+                <a:spcPct val="107000"/>
+              </a:lnSpc>
+              <a:spcBef>
+                <a:spcPts val="1200"/>
+              </a:spcBef>
+              <a:spcAft>
+                <a:spcPts val="600"/>
+              </a:spcAft>
+            </a:pPr>
+            <a:r>
+              <a:rPr lang="en-US" sz="1800" b="1" dirty="0">
+                <a:solidFill>
+                  <a:srgbClr val="FF0000"/>
+                </a:solidFill>
+                <a:effectLst/>
+                <a:latin typeface="Arial" panose="020B0604020202020204" pitchFamily="34" charset="0"/>
+                <a:ea typeface="Times New Roman" panose="02020603050405020304" pitchFamily="18" charset="0"/>
+              </a:rPr>
+              <a:t>STEP 1: </a:t>
+            </a:r>
+            <a:r>
+              <a:rPr lang="en-US" sz="1800" b="1" dirty="0">
+                <a:effectLst/>
+                <a:latin typeface="Arial" panose="020B0604020202020204" pitchFamily="34" charset="0"/>
+                <a:ea typeface="Times New Roman" panose="02020603050405020304" pitchFamily="18" charset="0"/>
+              </a:rPr>
+              <a:t>Launch the MPLAB X IDE</a:t>
+            </a:r>
+            <a:endParaRPr lang="en-US" sz="1800" dirty="0">
+              <a:effectLst/>
+              <a:latin typeface="Arial" panose="020B0604020202020204" pitchFamily="34" charset="0"/>
+              <a:ea typeface="Times New Roman" panose="02020603050405020304" pitchFamily="18" charset="0"/>
             </a:endParaRPr>
           </a:p>
           <a:p>
-            <a:r>
-              <a:rPr lang="en-US" sz="2000" dirty="0">
-                <a:hlinkClick r:id="rId2"/>
+            <a:pPr marL="457200" marR="0" indent="-457200">
+              <a:lnSpc>
+                <a:spcPct val="107000"/>
+              </a:lnSpc>
+              <a:spcBef>
+                <a:spcPts val="1200"/>
+              </a:spcBef>
+              <a:spcAft>
+                <a:spcPts val="600"/>
+              </a:spcAft>
+            </a:pPr>
+            <a:r>
+              <a:rPr lang="en-US" sz="1800" b="1" dirty="0">
+                <a:solidFill>
+                  <a:srgbClr val="FF0000"/>
+                </a:solidFill>
+                <a:effectLst/>
+                <a:latin typeface="Arial" panose="020B0604020202020204" pitchFamily="34" charset="0"/>
+                <a:ea typeface="Times New Roman" panose="02020603050405020304" pitchFamily="18" charset="0"/>
               </a:rPr>
-              <a:t>https://www.microchip.com/en-us/tools-resources/develop/mplab-x-ide#tabs</a:t>
-            </a:r>
-            <a:endParaRPr lang="en-US" sz="2000" dirty="0"/>
-          </a:p>
-          <a:p>
-            <a:endParaRPr lang="en-US" dirty="0"/>
-          </a:p>
-          <a:p>
-            <a:r>
-              <a:rPr lang="en-US" sz="2400" dirty="0"/>
-              <a:t>2. XC32 Compiler</a:t>
-            </a:r>
-          </a:p>
-          <a:p>
-            <a:endParaRPr lang="en-US" dirty="0">
-              <a:hlinkClick r:id="rId3"/>
+              <a:t>STEP 2: </a:t>
+            </a:r>
+            <a:r>
+              <a:rPr lang="en-US" sz="1800" b="1" dirty="0">
+                <a:effectLst/>
+                <a:latin typeface="Arial" panose="020B0604020202020204" pitchFamily="34" charset="0"/>
+                <a:ea typeface="Times New Roman" panose="02020603050405020304" pitchFamily="18" charset="0"/>
+              </a:rPr>
+              <a:t>Open the Demo Project</a:t>
+            </a:r>
+            <a:endParaRPr lang="en-US" sz="1800" dirty="0">
+              <a:effectLst/>
+              <a:latin typeface="Arial" panose="020B0604020202020204" pitchFamily="34" charset="0"/>
+              <a:ea typeface="Times New Roman" panose="02020603050405020304" pitchFamily="18" charset="0"/>
             </a:endParaRPr>
           </a:p>
           <a:p>
-            <a:r>
-              <a:rPr lang="en-US" sz="2000" dirty="0">
-                <a:hlinkClick r:id="rId3"/>
+            <a:pPr marL="690245" marR="0" indent="-342900">
+              <a:lnSpc>
+                <a:spcPct val="107000"/>
+              </a:lnSpc>
+              <a:spcBef>
+                <a:spcPts val="1200"/>
+              </a:spcBef>
+              <a:spcAft>
+                <a:spcPts val="600"/>
+              </a:spcAft>
+              <a:buFont typeface="+mj-lt"/>
+              <a:buAutoNum type="alphaLcParenR"/>
+            </a:pPr>
+            <a:r>
+              <a:rPr lang="en-US" sz="1800" dirty="0">
+                <a:effectLst/>
+                <a:latin typeface="Arial" panose="020B0604020202020204" pitchFamily="34" charset="0"/>
+                <a:ea typeface="Times New Roman" panose="02020603050405020304" pitchFamily="18" charset="0"/>
               </a:rPr>
-              <a:t>https://www.microchip.com/en-us/tools-resources/develop/mplab-xc-compilers/xc32</a:t>
-            </a:r>
-            <a:endParaRPr lang="en-US" sz="2000" dirty="0"/>
-          </a:p>
-          <a:p>
-            <a:endParaRPr lang="en-US" sz="2000" dirty="0"/>
-          </a:p>
-          <a:p>
-            <a:r>
-              <a:rPr lang="en-US" sz="2400" dirty="0"/>
-              <a:t>3. Microchip Bluetooth Data (MBD) Smartphone App</a:t>
-            </a:r>
-          </a:p>
-          <a:p>
-            <a:endParaRPr lang="en-US" sz="2000" dirty="0">
-              <a:hlinkClick r:id="rId3"/>
+              <a:t>From the MPLAB X main toolbar, select [File </a:t>
+            </a:r>
+            <a:r>
+              <a:rPr lang="en-US" sz="1800" dirty="0">
+                <a:effectLst/>
+                <a:latin typeface="Arial" panose="020B0604020202020204" pitchFamily="34" charset="0"/>
+                <a:ea typeface="Times New Roman" panose="02020603050405020304" pitchFamily="18" charset="0"/>
+                <a:sym typeface="Wingdings" pitchFamily="2" charset="2"/>
+              </a:rPr>
+              <a:t></a:t>
+            </a:r>
+            <a:r>
+              <a:rPr lang="en-US" sz="1800" dirty="0">
+                <a:effectLst/>
+                <a:latin typeface="Arial" panose="020B0604020202020204" pitchFamily="34" charset="0"/>
+                <a:ea typeface="Times New Roman" panose="02020603050405020304" pitchFamily="18" charset="0"/>
+              </a:rPr>
+              <a:t> Open Project]</a:t>
+            </a:r>
+          </a:p>
+          <a:p>
+            <a:pPr marL="690245" marR="0" indent="-342900">
+              <a:lnSpc>
+                <a:spcPct val="107000"/>
+              </a:lnSpc>
+              <a:spcBef>
+                <a:spcPts val="1200"/>
+              </a:spcBef>
+              <a:spcAft>
+                <a:spcPts val="600"/>
+              </a:spcAft>
+              <a:buFont typeface="+mj-lt"/>
+              <a:buAutoNum type="alphaLcParenR"/>
+            </a:pPr>
+            <a:r>
+              <a:rPr lang="en-US" sz="1800" dirty="0">
+                <a:effectLst/>
+                <a:latin typeface="Arial" panose="020B0604020202020204" pitchFamily="34" charset="0"/>
+                <a:ea typeface="Times New Roman" panose="02020603050405020304" pitchFamily="18" charset="0"/>
+              </a:rPr>
+              <a:t>Navigate to the location of the demo project folder:</a:t>
+            </a:r>
+          </a:p>
+          <a:p>
+            <a:pPr marL="804545" lvl="1">
+              <a:lnSpc>
+                <a:spcPct val="107000"/>
+              </a:lnSpc>
+              <a:spcBef>
+                <a:spcPts val="1200"/>
+              </a:spcBef>
+              <a:spcAft>
+                <a:spcPts val="600"/>
+              </a:spcAft>
+            </a:pPr>
+            <a:r>
+              <a:rPr lang="en-US" sz="1600" b="1" dirty="0">
+                <a:effectLst/>
+                <a:latin typeface="Arial" panose="020B0604020202020204" pitchFamily="34" charset="0"/>
+                <a:ea typeface="Times New Roman" panose="02020603050405020304" pitchFamily="18" charset="0"/>
+              </a:rPr>
+              <a:t>pic32cxbz2_wbz45x_ble_can_bridge </a:t>
+            </a:r>
+            <a:r>
+              <a:rPr lang="en-US" sz="1600" b="1" dirty="0">
+                <a:effectLst/>
+                <a:latin typeface="Arial" panose="020B0604020202020204" pitchFamily="34" charset="0"/>
+                <a:ea typeface="Times New Roman" panose="02020603050405020304" pitchFamily="18" charset="0"/>
+                <a:sym typeface="Wingdings" pitchFamily="2" charset="2"/>
+              </a:rPr>
+              <a:t> </a:t>
+            </a:r>
+            <a:r>
+              <a:rPr lang="en-US" sz="1600" b="1" dirty="0">
+                <a:effectLst/>
+                <a:latin typeface="Arial" panose="020B0604020202020204" pitchFamily="34" charset="0"/>
+                <a:ea typeface="Times New Roman" panose="02020603050405020304" pitchFamily="18" charset="0"/>
+              </a:rPr>
+              <a:t>02_wbz451_mcp251863_CAN_BLE_Peripheral</a:t>
+            </a:r>
+            <a:r>
+              <a:rPr lang="en-US" sz="1600" b="1" dirty="0">
+                <a:latin typeface="Arial" panose="020B0604020202020204" pitchFamily="34" charset="0"/>
+                <a:ea typeface="Times New Roman" panose="02020603050405020304" pitchFamily="18" charset="0"/>
+              </a:rPr>
+              <a:t> </a:t>
+            </a:r>
+            <a:r>
+              <a:rPr lang="en-US" sz="1600" b="1" dirty="0">
+                <a:latin typeface="Arial" panose="020B0604020202020204" pitchFamily="34" charset="0"/>
+                <a:ea typeface="Times New Roman" panose="02020603050405020304" pitchFamily="18" charset="0"/>
+                <a:sym typeface="Wingdings" pitchFamily="2" charset="2"/>
+              </a:rPr>
+              <a:t> </a:t>
+            </a:r>
+            <a:r>
+              <a:rPr lang="en-US" sz="1600" b="1" dirty="0">
+                <a:effectLst/>
+                <a:latin typeface="Arial" panose="020B0604020202020204" pitchFamily="34" charset="0"/>
+                <a:ea typeface="Times New Roman" panose="02020603050405020304" pitchFamily="18" charset="0"/>
+              </a:rPr>
+              <a:t>firmware</a:t>
+            </a:r>
+            <a:endParaRPr lang="en-US" sz="1600" dirty="0">
+              <a:effectLst/>
+              <a:latin typeface="Arial" panose="020B0604020202020204" pitchFamily="34" charset="0"/>
+              <a:ea typeface="Times New Roman" panose="02020603050405020304" pitchFamily="18" charset="0"/>
             </a:endParaRPr>
           </a:p>
           <a:p>
-            <a:r>
-              <a:rPr lang="en-US" sz="2000" dirty="0">
-                <a:hlinkClick r:id="rId4"/>
+            <a:pPr marL="690245" marR="0" indent="-342900">
+              <a:lnSpc>
+                <a:spcPct val="107000"/>
+              </a:lnSpc>
+              <a:spcBef>
+                <a:spcPts val="1200"/>
+              </a:spcBef>
+              <a:spcAft>
+                <a:spcPts val="600"/>
+              </a:spcAft>
+              <a:buFont typeface="+mj-lt"/>
+              <a:buAutoNum type="alphaLcParenR"/>
+            </a:pPr>
+            <a:r>
+              <a:rPr lang="en-US" sz="1800" dirty="0">
+                <a:effectLst/>
+                <a:latin typeface="Arial" panose="020B0604020202020204" pitchFamily="34" charset="0"/>
+                <a:ea typeface="Times New Roman" panose="02020603050405020304" pitchFamily="18" charset="0"/>
               </a:rPr>
-              <a:t>https://play.google.com/store/apps/details?id=com.microchip.bluetooth.data&amp;hl=en_US&amp;pli=1</a:t>
-            </a:r>
-            <a:endParaRPr lang="en-US" sz="2000" dirty="0"/>
+              <a:t>Select (click on) the </a:t>
+            </a:r>
+            <a:r>
+              <a:rPr lang="en-US" sz="1800" b="1" dirty="0" err="1">
+                <a:effectLst/>
+                <a:latin typeface="Arial" panose="020B0604020202020204" pitchFamily="34" charset="0"/>
+                <a:ea typeface="Times New Roman" panose="02020603050405020304" pitchFamily="18" charset="0"/>
+              </a:rPr>
+              <a:t>bleCan_Peripheral.X</a:t>
+            </a:r>
+            <a:r>
+              <a:rPr lang="en-US" sz="1800" dirty="0">
+                <a:effectLst/>
+                <a:latin typeface="Arial" panose="020B0604020202020204" pitchFamily="34" charset="0"/>
+                <a:ea typeface="Times New Roman" panose="02020603050405020304" pitchFamily="18" charset="0"/>
+              </a:rPr>
+              <a:t> project folder</a:t>
+            </a:r>
+          </a:p>
+          <a:p>
+            <a:pPr marL="690245" marR="0" indent="-342900">
+              <a:lnSpc>
+                <a:spcPct val="107000"/>
+              </a:lnSpc>
+              <a:spcBef>
+                <a:spcPts val="1200"/>
+              </a:spcBef>
+              <a:spcAft>
+                <a:spcPts val="600"/>
+              </a:spcAft>
+              <a:buFont typeface="+mj-lt"/>
+              <a:buAutoNum type="alphaLcParenR"/>
+            </a:pPr>
+            <a:r>
+              <a:rPr lang="en-US" sz="1800" dirty="0">
+                <a:effectLst/>
+                <a:latin typeface="Arial" panose="020B0604020202020204" pitchFamily="34" charset="0"/>
+                <a:ea typeface="Times New Roman" panose="02020603050405020304" pitchFamily="18" charset="0"/>
+              </a:rPr>
+              <a:t>Click on the </a:t>
+            </a:r>
+            <a:r>
+              <a:rPr lang="en-US" sz="1800" b="1" dirty="0">
+                <a:effectLst/>
+                <a:latin typeface="Arial" panose="020B0604020202020204" pitchFamily="34" charset="0"/>
+                <a:ea typeface="Times New Roman" panose="02020603050405020304" pitchFamily="18" charset="0"/>
+              </a:rPr>
+              <a:t>Open Project </a:t>
+            </a:r>
+            <a:r>
+              <a:rPr lang="en-US" sz="1800" dirty="0">
+                <a:effectLst/>
+                <a:latin typeface="Arial" panose="020B0604020202020204" pitchFamily="34" charset="0"/>
+                <a:ea typeface="Times New Roman" panose="02020603050405020304" pitchFamily="18" charset="0"/>
+              </a:rPr>
+              <a:t>button</a:t>
+            </a:r>
+          </a:p>
+          <a:p>
+            <a:pPr marL="457200" marR="0" indent="-457200">
+              <a:lnSpc>
+                <a:spcPct val="107000"/>
+              </a:lnSpc>
+              <a:spcBef>
+                <a:spcPts val="1200"/>
+              </a:spcBef>
+              <a:spcAft>
+                <a:spcPts val="600"/>
+              </a:spcAft>
+            </a:pPr>
+            <a:r>
+              <a:rPr lang="en-US" sz="1800" b="1" dirty="0">
+                <a:solidFill>
+                  <a:srgbClr val="FF0000"/>
+                </a:solidFill>
+                <a:effectLst/>
+                <a:latin typeface="Arial" panose="020B0604020202020204" pitchFamily="34" charset="0"/>
+                <a:ea typeface="Times New Roman" panose="02020603050405020304" pitchFamily="18" charset="0"/>
+              </a:rPr>
+              <a:t>STEP 3: </a:t>
+            </a:r>
+            <a:r>
+              <a:rPr lang="en-US" sz="1800" b="1" dirty="0">
+                <a:effectLst/>
+                <a:latin typeface="Arial" panose="020B0604020202020204" pitchFamily="34" charset="0"/>
+                <a:ea typeface="Times New Roman" panose="02020603050405020304" pitchFamily="18" charset="0"/>
+              </a:rPr>
+              <a:t>Clean and Build the Project</a:t>
+            </a:r>
+            <a:endParaRPr lang="en-US" sz="1800" dirty="0">
+              <a:effectLst/>
+              <a:latin typeface="Arial" panose="020B0604020202020204" pitchFamily="34" charset="0"/>
+              <a:ea typeface="Times New Roman" panose="02020603050405020304" pitchFamily="18" charset="0"/>
+            </a:endParaRPr>
+          </a:p>
+          <a:p>
+            <a:pPr marL="923290" marR="0" indent="-575945">
+              <a:lnSpc>
+                <a:spcPct val="107000"/>
+              </a:lnSpc>
+              <a:spcBef>
+                <a:spcPts val="1200"/>
+              </a:spcBef>
+              <a:spcAft>
+                <a:spcPts val="600"/>
+              </a:spcAft>
+            </a:pPr>
+            <a:r>
+              <a:rPr lang="en-US" sz="1800" dirty="0">
+                <a:effectLst/>
+                <a:latin typeface="Arial" panose="020B0604020202020204" pitchFamily="34" charset="0"/>
+                <a:ea typeface="Times New Roman" panose="02020603050405020304" pitchFamily="18" charset="0"/>
+              </a:rPr>
+              <a:t>Click on the </a:t>
+            </a:r>
+            <a:r>
+              <a:rPr lang="en-US" sz="1800" b="1" dirty="0">
+                <a:effectLst/>
+                <a:latin typeface="Arial" panose="020B0604020202020204" pitchFamily="34" charset="0"/>
+                <a:ea typeface="Times New Roman" panose="02020603050405020304" pitchFamily="18" charset="0"/>
+              </a:rPr>
+              <a:t>Clean and Build Main Project</a:t>
+            </a:r>
+            <a:r>
+              <a:rPr lang="en-US" sz="1800" dirty="0">
+                <a:effectLst/>
+                <a:latin typeface="Arial" panose="020B0604020202020204" pitchFamily="34" charset="0"/>
+                <a:ea typeface="Times New Roman" panose="02020603050405020304" pitchFamily="18" charset="0"/>
+              </a:rPr>
+              <a:t> icon in the MPLAB X main toolbar</a:t>
+            </a:r>
           </a:p>
           <a:p>
             <a:endParaRPr lang="en-US" sz="2000" dirty="0"/>
@@ -12707,10 +12431,10 @@
       </p:sp>
       <p:pic>
         <p:nvPicPr>
-          <p:cNvPr id="3" name="Picture 2" descr="A black text on a white background&#10;&#10;Description automatically generated">
-            <a:extLst>
-              <a:ext uri="{FF2B5EF4-FFF2-40B4-BE49-F238E27FC236}">
-                <a16:creationId xmlns:a16="http://schemas.microsoft.com/office/drawing/2014/main" id="{F9CEA8E3-DBFA-F42F-8690-7924C2016DAE}"/>
+          <p:cNvPr id="7" name="Picture 6" descr="Graphical user interface, text, application, chat or text message&#10;&#10;Description automatically generated">
+            <a:extLst>
+              <a:ext uri="{FF2B5EF4-FFF2-40B4-BE49-F238E27FC236}">
+                <a16:creationId xmlns:a16="http://schemas.microsoft.com/office/drawing/2014/main" id="{CAF2B978-8883-E4D9-D5E8-30E33767B60A}"/>
               </a:ext>
             </a:extLst>
           </p:cNvPr>
@@ -12720,13 +12444,128 @@
           <p:nvPr/>
         </p:nvPicPr>
         <p:blipFill>
-          <a:blip r:embed="rId5"/>
+          <a:blip r:embed="rId2">
+            <a:extLst>
+              <a:ext uri="{28A0092B-C50C-407E-A947-70E740481C1C}">
+                <a14:useLocalDpi xmlns:a14="http://schemas.microsoft.com/office/drawing/2010/main" val="0"/>
+              </a:ext>
+            </a:extLst>
+          </a:blip>
           <a:stretch>
             <a:fillRect/>
           </a:stretch>
         </p:blipFill>
         <p:spPr>
           <a:xfrm>
+            <a:off x="1636949" y="5182413"/>
+            <a:ext cx="5156200" cy="1409700"/>
+          </a:xfrm>
+          <a:prstGeom prst="rect">
+            <a:avLst/>
+          </a:prstGeom>
+        </p:spPr>
+      </p:pic>
+      <p:sp>
+        <p:nvSpPr>
+          <p:cNvPr id="8" name="Right Arrow 7">
+            <a:extLst>
+              <a:ext uri="{FF2B5EF4-FFF2-40B4-BE49-F238E27FC236}">
+                <a16:creationId xmlns:a16="http://schemas.microsoft.com/office/drawing/2014/main" id="{7E5F9613-C9B4-A621-2173-3A49D330AB77}"/>
+              </a:ext>
+            </a:extLst>
+          </p:cNvPr>
+          <p:cNvSpPr/>
+          <p:nvPr/>
+        </p:nvSpPr>
+        <p:spPr>
+          <a:xfrm>
+            <a:off x="936440" y="5240592"/>
+            <a:ext cx="838200" cy="558800"/>
+          </a:xfrm>
+          <a:prstGeom prst="rightArrow">
+            <a:avLst/>
+          </a:prstGeom>
+          <a:solidFill>
+            <a:srgbClr val="FF0000"/>
+          </a:solidFill>
+        </p:spPr>
+        <p:style>
+          <a:lnRef idx="2">
+            <a:schemeClr val="accent1">
+              <a:shade val="50000"/>
+            </a:schemeClr>
+          </a:lnRef>
+          <a:fillRef idx="1">
+            <a:schemeClr val="accent1"/>
+          </a:fillRef>
+          <a:effectRef idx="0">
+            <a:schemeClr val="accent1"/>
+          </a:effectRef>
+          <a:fontRef idx="minor">
+            <a:schemeClr val="lt1"/>
+          </a:fontRef>
+        </p:style>
+        <p:txBody>
+          <a:bodyPr rot="0" spcFirstLastPara="0" vert="horz" wrap="square" lIns="91440" tIns="45720" rIns="91440" bIns="45720" numCol="1" spcCol="0" rtlCol="0" fromWordArt="0" anchor="ctr" anchorCtr="0" forceAA="0" compatLnSpc="1">
+            <a:prstTxWarp prst="textNoShape">
+              <a:avLst/>
+            </a:prstTxWarp>
+            <a:noAutofit/>
+          </a:bodyPr>
+          <a:lstStyle/>
+          <a:p>
+            <a:pPr marL="0" marR="0" algn="ctr">
+              <a:lnSpc>
+                <a:spcPct val="107000"/>
+              </a:lnSpc>
+              <a:spcBef>
+                <a:spcPts val="0"/>
+              </a:spcBef>
+              <a:spcAft>
+                <a:spcPts val="800"/>
+              </a:spcAft>
+            </a:pPr>
+            <a:r>
+              <a:rPr lang="en-US" sz="1200">
+                <a:solidFill>
+                  <a:srgbClr val="FFFF00"/>
+                </a:solidFill>
+                <a:effectLst/>
+                <a:latin typeface="Arial" panose="020B0604020202020204" pitchFamily="34" charset="0"/>
+                <a:ea typeface="Times New Roman" panose="02020603050405020304" pitchFamily="18" charset="0"/>
+              </a:rPr>
+              <a:t>CLICK</a:t>
+            </a:r>
+            <a:endParaRPr lang="en-US" sz="1100">
+              <a:effectLst/>
+              <a:latin typeface="Arial" panose="020B0604020202020204" pitchFamily="34" charset="0"/>
+              <a:ea typeface="Times New Roman" panose="02020603050405020304" pitchFamily="18" charset="0"/>
+            </a:endParaRPr>
+          </a:p>
+        </p:txBody>
+      </p:sp>
+      <p:pic>
+        <p:nvPicPr>
+          <p:cNvPr id="9" name="Picture 8" descr="A black text on a white background&#10;&#10;Description automatically generated">
+            <a:extLst>
+              <a:ext uri="{FF2B5EF4-FFF2-40B4-BE49-F238E27FC236}">
+                <a16:creationId xmlns:a16="http://schemas.microsoft.com/office/drawing/2014/main" id="{00FBCB51-BC78-FECA-56D9-295883A977E3}"/>
+              </a:ext>
+            </a:extLst>
+          </p:cNvPr>
+          <p:cNvPicPr>
+            <a:picLocks noChangeAspect="1"/>
+          </p:cNvPicPr>
+          <p:nvPr/>
+        </p:nvPicPr>
+        <p:blipFill>
+          <a:blip r:embed="rId3"/>
+          <a:stretch>
+            <a:fillRect/>
+          </a:stretch>
+        </p:blipFill>
+        <p:spPr>
+          <a:xfrm>
             <a:off x="9574022" y="6138164"/>
             <a:ext cx="2578100" cy="698500"/>
           </a:xfrm>
@@ -12738,7 +12577,7 @@
     </p:spTree>
     <p:extLst>
       <p:ext uri="{BB962C8B-B14F-4D97-AF65-F5344CB8AC3E}">
-        <p14:creationId xmlns:p14="http://schemas.microsoft.com/office/powerpoint/2010/main" val="535867481"/>
+        <p14:creationId xmlns:p14="http://schemas.microsoft.com/office/powerpoint/2010/main" val="3967660036"/>
       </p:ext>
     </p:extLst>
   </p:cSld>

</xml_diff>